<commit_message>
pushing the pptx final
</commit_message>
<xml_diff>
--- a/The Underlying Causes of Diabetes_Final.pptx
+++ b/The Underlying Causes of Diabetes_Final.pptx
@@ -5,10 +5,10 @@
     <p:sldMasterId id="2147483684" r:id="rId4"/>
   </p:sldMasterIdLst>
   <p:notesMasterIdLst>
-    <p:notesMasterId r:id="rId21"/>
+    <p:notesMasterId r:id="rId18"/>
   </p:notesMasterIdLst>
   <p:handoutMasterIdLst>
-    <p:handoutMasterId r:id="rId22"/>
+    <p:handoutMasterId r:id="rId19"/>
   </p:handoutMasterIdLst>
   <p:sldIdLst>
     <p:sldId id="257" r:id="rId5"/>
@@ -17,16 +17,13 @@
     <p:sldId id="398" r:id="rId8"/>
     <p:sldId id="278" r:id="rId9"/>
     <p:sldId id="400" r:id="rId10"/>
-    <p:sldId id="392" r:id="rId11"/>
-    <p:sldId id="401" r:id="rId12"/>
-    <p:sldId id="393" r:id="rId13"/>
-    <p:sldId id="395" r:id="rId14"/>
-    <p:sldId id="396" r:id="rId15"/>
-    <p:sldId id="397" r:id="rId16"/>
-    <p:sldId id="321" r:id="rId17"/>
-    <p:sldId id="391" r:id="rId18"/>
-    <p:sldId id="399" r:id="rId19"/>
-    <p:sldId id="394" r:id="rId20"/>
+    <p:sldId id="393" r:id="rId11"/>
+    <p:sldId id="395" r:id="rId12"/>
+    <p:sldId id="396" r:id="rId13"/>
+    <p:sldId id="397" r:id="rId14"/>
+    <p:sldId id="321" r:id="rId15"/>
+    <p:sldId id="391" r:id="rId16"/>
+    <p:sldId id="399" r:id="rId17"/>
   </p:sldIdLst>
   <p:sldSz cx="12192000" cy="6858000"/>
   <p:notesSz cx="6858000" cy="9144000"/>
@@ -147,6 +144,217 @@
 </p:presentation>
 </file>
 
+<file path=ppt/changesInfos/changesInfo1.xml><?xml version="1.0" encoding="utf-8"?>
+<pc:chgInfo xmlns:a="http://schemas.openxmlformats.org/drawingml/2006/main" xmlns:r="http://schemas.openxmlformats.org/officeDocument/2006/relationships" xmlns:ac="http://schemas.microsoft.com/office/drawing/2013/main/command" xmlns:pc="http://schemas.microsoft.com/office/powerpoint/2013/main/command">
+  <pc:docChgLst>
+    <pc:chgData name="charles descheneaux" userId="1ef981ae4e28f1b1" providerId="LiveId" clId="{6AEBB01A-9445-471A-BA60-6005CDB569B7}"/>
+    <pc:docChg chg="custSel delSld modSld sldOrd modShowInfo">
+      <pc:chgData name="charles descheneaux" userId="1ef981ae4e28f1b1" providerId="LiveId" clId="{6AEBB01A-9445-471A-BA60-6005CDB569B7}" dt="2023-05-04T00:24:26.992" v="399" actId="20577"/>
+      <pc:docMkLst>
+        <pc:docMk/>
+      </pc:docMkLst>
+      <pc:sldChg chg="modSp mod">
+        <pc:chgData name="charles descheneaux" userId="1ef981ae4e28f1b1" providerId="LiveId" clId="{6AEBB01A-9445-471A-BA60-6005CDB569B7}" dt="2023-05-04T00:04:01.005" v="201" actId="2"/>
+        <pc:sldMkLst>
+          <pc:docMk/>
+          <pc:sldMk cId="752814286" sldId="257"/>
+        </pc:sldMkLst>
+        <pc:spChg chg="mod">
+          <ac:chgData name="charles descheneaux" userId="1ef981ae4e28f1b1" providerId="LiveId" clId="{6AEBB01A-9445-471A-BA60-6005CDB569B7}" dt="2023-05-04T00:04:01.005" v="201" actId="2"/>
+          <ac:spMkLst>
+            <pc:docMk/>
+            <pc:sldMk cId="752814286" sldId="257"/>
+            <ac:spMk id="7" creationId="{92C10A22-7F9F-DB03-2FCD-F3D074EBF6CA}"/>
+          </ac:spMkLst>
+        </pc:spChg>
+      </pc:sldChg>
+      <pc:sldChg chg="modSp mod">
+        <pc:chgData name="charles descheneaux" userId="1ef981ae4e28f1b1" providerId="LiveId" clId="{6AEBB01A-9445-471A-BA60-6005CDB569B7}" dt="2023-05-03T23:21:01.430" v="106" actId="20577"/>
+        <pc:sldMkLst>
+          <pc:docMk/>
+          <pc:sldMk cId="3521561301" sldId="321"/>
+        </pc:sldMkLst>
+        <pc:spChg chg="mod">
+          <ac:chgData name="charles descheneaux" userId="1ef981ae4e28f1b1" providerId="LiveId" clId="{6AEBB01A-9445-471A-BA60-6005CDB569B7}" dt="2023-05-03T23:21:01.430" v="106" actId="20577"/>
+          <ac:spMkLst>
+            <pc:docMk/>
+            <pc:sldMk cId="3521561301" sldId="321"/>
+            <ac:spMk id="11" creationId="{581E8936-2270-47FE-94A4-398CB123EF90}"/>
+          </ac:spMkLst>
+        </pc:spChg>
+      </pc:sldChg>
+      <pc:sldChg chg="modSp mod">
+        <pc:chgData name="charles descheneaux" userId="1ef981ae4e28f1b1" providerId="LiveId" clId="{6AEBB01A-9445-471A-BA60-6005CDB569B7}" dt="2023-05-04T00:02:18.768" v="196" actId="20577"/>
+        <pc:sldMkLst>
+          <pc:docMk/>
+          <pc:sldMk cId="2158886557" sldId="384"/>
+        </pc:sldMkLst>
+        <pc:spChg chg="mod">
+          <ac:chgData name="charles descheneaux" userId="1ef981ae4e28f1b1" providerId="LiveId" clId="{6AEBB01A-9445-471A-BA60-6005CDB569B7}" dt="2023-05-04T00:02:18.768" v="196" actId="20577"/>
+          <ac:spMkLst>
+            <pc:docMk/>
+            <pc:sldMk cId="2158886557" sldId="384"/>
+            <ac:spMk id="12" creationId="{E5127060-CDBF-435F-9009-A5451CCE305D}"/>
+          </ac:spMkLst>
+        </pc:spChg>
+      </pc:sldChg>
+      <pc:sldChg chg="modSp mod">
+        <pc:chgData name="charles descheneaux" userId="1ef981ae4e28f1b1" providerId="LiveId" clId="{6AEBB01A-9445-471A-BA60-6005CDB569B7}" dt="2023-05-03T23:43:24.246" v="176" actId="14100"/>
+        <pc:sldMkLst>
+          <pc:docMk/>
+          <pc:sldMk cId="2313234867" sldId="389"/>
+        </pc:sldMkLst>
+        <pc:spChg chg="mod">
+          <ac:chgData name="charles descheneaux" userId="1ef981ae4e28f1b1" providerId="LiveId" clId="{6AEBB01A-9445-471A-BA60-6005CDB569B7}" dt="2023-05-03T23:43:24.246" v="176" actId="14100"/>
+          <ac:spMkLst>
+            <pc:docMk/>
+            <pc:sldMk cId="2313234867" sldId="389"/>
+            <ac:spMk id="3" creationId="{D3B60D6F-4D0F-4D33-B2A7-159C8583FF00}"/>
+          </ac:spMkLst>
+        </pc:spChg>
+      </pc:sldChg>
+      <pc:sldChg chg="del ord">
+        <pc:chgData name="charles descheneaux" userId="1ef981ae4e28f1b1" providerId="LiveId" clId="{6AEBB01A-9445-471A-BA60-6005CDB569B7}" dt="2023-05-03T23:38:53.792" v="112" actId="2696"/>
+        <pc:sldMkLst>
+          <pc:docMk/>
+          <pc:sldMk cId="3925428744" sldId="392"/>
+        </pc:sldMkLst>
+      </pc:sldChg>
+      <pc:sldChg chg="addSp delSp modSp mod">
+        <pc:chgData name="charles descheneaux" userId="1ef981ae4e28f1b1" providerId="LiveId" clId="{6AEBB01A-9445-471A-BA60-6005CDB569B7}" dt="2023-05-04T00:24:26.992" v="399" actId="20577"/>
+        <pc:sldMkLst>
+          <pc:docMk/>
+          <pc:sldMk cId="59226085" sldId="393"/>
+        </pc:sldMkLst>
+        <pc:spChg chg="del">
+          <ac:chgData name="charles descheneaux" userId="1ef981ae4e28f1b1" providerId="LiveId" clId="{6AEBB01A-9445-471A-BA60-6005CDB569B7}" dt="2023-05-03T23:08:47.759" v="0" actId="22"/>
+          <ac:spMkLst>
+            <pc:docMk/>
+            <pc:sldMk cId="59226085" sldId="393"/>
+            <ac:spMk id="7" creationId="{59E15C45-84E1-DFDF-3671-B442930B194F}"/>
+          </ac:spMkLst>
+        </pc:spChg>
+        <pc:spChg chg="add mod">
+          <ac:chgData name="charles descheneaux" userId="1ef981ae4e28f1b1" providerId="LiveId" clId="{6AEBB01A-9445-471A-BA60-6005CDB569B7}" dt="2023-05-04T00:24:26.992" v="399" actId="20577"/>
+          <ac:spMkLst>
+            <pc:docMk/>
+            <pc:sldMk cId="59226085" sldId="393"/>
+            <ac:spMk id="8" creationId="{62D5BFB5-3AF1-FE73-E442-41251A4C9C79}"/>
+          </ac:spMkLst>
+        </pc:spChg>
+        <pc:picChg chg="add mod ord">
+          <ac:chgData name="charles descheneaux" userId="1ef981ae4e28f1b1" providerId="LiveId" clId="{6AEBB01A-9445-471A-BA60-6005CDB569B7}" dt="2023-05-04T00:19:06.265" v="217" actId="14100"/>
+          <ac:picMkLst>
+            <pc:docMk/>
+            <pc:sldMk cId="59226085" sldId="393"/>
+            <ac:picMk id="4" creationId="{704CB478-6D26-76BC-134F-CD1D3CAA5BCD}"/>
+          </ac:picMkLst>
+        </pc:picChg>
+        <pc:picChg chg="add del mod">
+          <ac:chgData name="charles descheneaux" userId="1ef981ae4e28f1b1" providerId="LiveId" clId="{6AEBB01A-9445-471A-BA60-6005CDB569B7}" dt="2023-05-04T00:19:39.415" v="220" actId="21"/>
+          <ac:picMkLst>
+            <pc:docMk/>
+            <pc:sldMk cId="59226085" sldId="393"/>
+            <ac:picMk id="5" creationId="{BCD99212-07D0-F8C4-E728-09689486DC1A}"/>
+          </ac:picMkLst>
+        </pc:picChg>
+        <pc:picChg chg="add mod">
+          <ac:chgData name="charles descheneaux" userId="1ef981ae4e28f1b1" providerId="LiveId" clId="{6AEBB01A-9445-471A-BA60-6005CDB569B7}" dt="2023-05-04T00:20:46.618" v="227" actId="14100"/>
+          <ac:picMkLst>
+            <pc:docMk/>
+            <pc:sldMk cId="59226085" sldId="393"/>
+            <ac:picMk id="6" creationId="{0D9794A7-08C1-F734-5D1E-DED12EAD06E0}"/>
+          </ac:picMkLst>
+        </pc:picChg>
+        <pc:picChg chg="add del mod">
+          <ac:chgData name="charles descheneaux" userId="1ef981ae4e28f1b1" providerId="LiveId" clId="{6AEBB01A-9445-471A-BA60-6005CDB569B7}" dt="2023-05-04T00:19:35.521" v="219" actId="21"/>
+          <ac:picMkLst>
+            <pc:docMk/>
+            <pc:sldMk cId="59226085" sldId="393"/>
+            <ac:picMk id="9" creationId="{C1763CFE-3BF5-3AFC-BC6D-8FAA412A7850}"/>
+          </ac:picMkLst>
+        </pc:picChg>
+        <pc:picChg chg="add mod">
+          <ac:chgData name="charles descheneaux" userId="1ef981ae4e28f1b1" providerId="LiveId" clId="{6AEBB01A-9445-471A-BA60-6005CDB569B7}" dt="2023-05-04T00:20:54.520" v="229" actId="14100"/>
+          <ac:picMkLst>
+            <pc:docMk/>
+            <pc:sldMk cId="59226085" sldId="393"/>
+            <ac:picMk id="11" creationId="{CB2854D8-36C4-D465-FE86-A66FEA2DD976}"/>
+          </ac:picMkLst>
+        </pc:picChg>
+        <pc:picChg chg="add mod">
+          <ac:chgData name="charles descheneaux" userId="1ef981ae4e28f1b1" providerId="LiveId" clId="{6AEBB01A-9445-471A-BA60-6005CDB569B7}" dt="2023-05-04T00:21:55.149" v="235" actId="14100"/>
+          <ac:picMkLst>
+            <pc:docMk/>
+            <pc:sldMk cId="59226085" sldId="393"/>
+            <ac:picMk id="13" creationId="{DBAF9021-9B39-C84F-CEC2-EBF82911B1B5}"/>
+          </ac:picMkLst>
+        </pc:picChg>
+      </pc:sldChg>
+      <pc:sldChg chg="del">
+        <pc:chgData name="charles descheneaux" userId="1ef981ae4e28f1b1" providerId="LiveId" clId="{6AEBB01A-9445-471A-BA60-6005CDB569B7}" dt="2023-05-03T23:11:42.709" v="81" actId="2696"/>
+        <pc:sldMkLst>
+          <pc:docMk/>
+          <pc:sldMk cId="523071793" sldId="394"/>
+        </pc:sldMkLst>
+      </pc:sldChg>
+      <pc:sldChg chg="modSp mod">
+        <pc:chgData name="charles descheneaux" userId="1ef981ae4e28f1b1" providerId="LiveId" clId="{6AEBB01A-9445-471A-BA60-6005CDB569B7}" dt="2023-05-04T00:03:56.342" v="198" actId="2"/>
+        <pc:sldMkLst>
+          <pc:docMk/>
+          <pc:sldMk cId="4155905521" sldId="395"/>
+        </pc:sldMkLst>
+        <pc:spChg chg="mod">
+          <ac:chgData name="charles descheneaux" userId="1ef981ae4e28f1b1" providerId="LiveId" clId="{6AEBB01A-9445-471A-BA60-6005CDB569B7}" dt="2023-05-04T00:03:56.342" v="198" actId="2"/>
+          <ac:spMkLst>
+            <pc:docMk/>
+            <pc:sldMk cId="4155905521" sldId="395"/>
+            <ac:spMk id="3" creationId="{AEF48555-C636-995C-6614-5D5A7B3E5FB2}"/>
+          </ac:spMkLst>
+        </pc:spChg>
+      </pc:sldChg>
+      <pc:sldChg chg="modSp mod">
+        <pc:chgData name="charles descheneaux" userId="1ef981ae4e28f1b1" providerId="LiveId" clId="{6AEBB01A-9445-471A-BA60-6005CDB569B7}" dt="2023-05-04T00:03:58.656" v="200" actId="2"/>
+        <pc:sldMkLst>
+          <pc:docMk/>
+          <pc:sldMk cId="1436951672" sldId="396"/>
+        </pc:sldMkLst>
+        <pc:spChg chg="mod">
+          <ac:chgData name="charles descheneaux" userId="1ef981ae4e28f1b1" providerId="LiveId" clId="{6AEBB01A-9445-471A-BA60-6005CDB569B7}" dt="2023-05-04T00:03:58.656" v="200" actId="2"/>
+          <ac:spMkLst>
+            <pc:docMk/>
+            <pc:sldMk cId="1436951672" sldId="396"/>
+            <ac:spMk id="4" creationId="{79444BC7-0BA1-C581-8838-906EF14A3079}"/>
+          </ac:spMkLst>
+        </pc:spChg>
+      </pc:sldChg>
+      <pc:sldChg chg="modSp mod">
+        <pc:chgData name="charles descheneaux" userId="1ef981ae4e28f1b1" providerId="LiveId" clId="{6AEBB01A-9445-471A-BA60-6005CDB569B7}" dt="2023-05-03T23:23:44.578" v="111" actId="14100"/>
+        <pc:sldMkLst>
+          <pc:docMk/>
+          <pc:sldMk cId="2279883" sldId="398"/>
+        </pc:sldMkLst>
+        <pc:spChg chg="mod">
+          <ac:chgData name="charles descheneaux" userId="1ef981ae4e28f1b1" providerId="LiveId" clId="{6AEBB01A-9445-471A-BA60-6005CDB569B7}" dt="2023-05-03T23:23:44.578" v="111" actId="14100"/>
+          <ac:spMkLst>
+            <pc:docMk/>
+            <pc:sldMk cId="2279883" sldId="398"/>
+            <ac:spMk id="9" creationId="{758B568F-CDF3-FA2F-7664-CDE90A4CAE27}"/>
+          </ac:spMkLst>
+        </pc:spChg>
+      </pc:sldChg>
+      <pc:sldChg chg="del ord">
+        <pc:chgData name="charles descheneaux" userId="1ef981ae4e28f1b1" providerId="LiveId" clId="{6AEBB01A-9445-471A-BA60-6005CDB569B7}" dt="2023-05-03T23:38:56.419" v="113" actId="2696"/>
+        <pc:sldMkLst>
+          <pc:docMk/>
+          <pc:sldMk cId="3227877829" sldId="401"/>
+        </pc:sldMkLst>
+      </pc:sldChg>
+    </pc:docChg>
+  </pc:docChgLst>
+</pc:chgInfo>
+</file>
+
 <file path=ppt/handoutMasters/handoutMaster1.xml><?xml version="1.0" encoding="utf-8"?>
 <p:handoutMaster xmlns:a="http://schemas.openxmlformats.org/drawingml/2006/main" xmlns:r="http://schemas.openxmlformats.org/officeDocument/2006/relationships" xmlns:p="http://schemas.openxmlformats.org/presentationml/2006/main">
   <p:cSld>
@@ -202,7 +410,7 @@
             </a:lvl1pPr>
           </a:lstStyle>
           <a:p>
-            <a:endParaRPr lang="en-US"/>
+            <a:endParaRPr lang="en-US" dirty="0"/>
           </a:p>
         </p:txBody>
       </p:sp>
@@ -241,9 +449,9 @@
           <a:p>
             <a:fld id="{C17F2C1D-F243-42AB-ADF2-E7CB4E04900E}" type="datetimeFigureOut">
               <a:rPr lang="en-US" smtClean="0"/>
-              <a:t>5/1/2023</a:t>
+              <a:t>5/3/2023</a:t>
             </a:fld>
-            <a:endParaRPr lang="en-US"/>
+            <a:endParaRPr lang="en-US" dirty="0"/>
           </a:p>
         </p:txBody>
       </p:sp>
@@ -280,7 +488,7 @@
             </a:lvl1pPr>
           </a:lstStyle>
           <a:p>
-            <a:endParaRPr lang="en-US"/>
+            <a:endParaRPr lang="en-US" dirty="0"/>
           </a:p>
         </p:txBody>
       </p:sp>
@@ -321,7 +529,7 @@
               <a:rPr lang="en-US" smtClean="0"/>
               <a:t>‹#›</a:t>
             </a:fld>
-            <a:endParaRPr lang="en-US"/>
+            <a:endParaRPr lang="en-US" dirty="0"/>
           </a:p>
         </p:txBody>
       </p:sp>
@@ -385,7 +593,7 @@
             </a:lvl1pPr>
           </a:lstStyle>
           <a:p>
-            <a:endParaRPr lang="en-US"/>
+            <a:endParaRPr lang="en-US" dirty="0"/>
           </a:p>
         </p:txBody>
       </p:sp>
@@ -418,9 +626,9 @@
           <a:p>
             <a:fld id="{020CE34E-5667-4A32-A6BA-10C7A552BC63}" type="datetimeFigureOut">
               <a:rPr lang="en-US" smtClean="0"/>
-              <a:t>5/1/2023</a:t>
+              <a:t>5/3/2023</a:t>
             </a:fld>
-            <a:endParaRPr lang="en-US"/>
+            <a:endParaRPr lang="en-US" dirty="0"/>
           </a:p>
         </p:txBody>
       </p:sp>
@@ -453,7 +661,7 @@
           <a:bodyPr vert="horz" lIns="91440" tIns="45720" rIns="91440" bIns="45720" rtlCol="0" anchor="ctr"/>
           <a:lstStyle/>
           <a:p>
-            <a:endParaRPr lang="en-US"/>
+            <a:endParaRPr lang="en-US" dirty="0"/>
           </a:p>
         </p:txBody>
       </p:sp>
@@ -543,7 +751,7 @@
             </a:lvl1pPr>
           </a:lstStyle>
           <a:p>
-            <a:endParaRPr lang="en-US"/>
+            <a:endParaRPr lang="en-US" dirty="0"/>
           </a:p>
         </p:txBody>
       </p:sp>
@@ -578,7 +786,7 @@
               <a:rPr lang="en-US" smtClean="0"/>
               <a:t>‹#›</a:t>
             </a:fld>
-            <a:endParaRPr lang="en-US"/>
+            <a:endParaRPr lang="en-US" dirty="0"/>
           </a:p>
         </p:txBody>
       </p:sp>
@@ -752,7 +960,7 @@
               <a:rPr lang="en-US" smtClean="0"/>
               <a:t>1</a:t>
             </a:fld>
-            <a:endParaRPr lang="en-US"/>
+            <a:endParaRPr lang="en-US" dirty="0"/>
           </a:p>
         </p:txBody>
       </p:sp>
@@ -813,7 +1021,7 @@
           <a:bodyPr/>
           <a:lstStyle/>
           <a:p>
-            <a:endParaRPr lang="en-US"/>
+            <a:endParaRPr lang="en-US" dirty="0"/>
           </a:p>
         </p:txBody>
       </p:sp>
@@ -836,7 +1044,7 @@
               <a:rPr lang="en-US" smtClean="0"/>
               <a:t>2</a:t>
             </a:fld>
-            <a:endParaRPr lang="en-US"/>
+            <a:endParaRPr lang="en-US" dirty="0"/>
           </a:p>
         </p:txBody>
       </p:sp>
@@ -920,7 +1128,7 @@
               <a:rPr lang="en-US" smtClean="0"/>
               <a:t>3</a:t>
             </a:fld>
-            <a:endParaRPr lang="en-US"/>
+            <a:endParaRPr lang="en-US" dirty="0"/>
           </a:p>
         </p:txBody>
       </p:sp>
@@ -1004,7 +1212,7 @@
               <a:rPr lang="en-US" smtClean="0"/>
               <a:t>4</a:t>
             </a:fld>
-            <a:endParaRPr lang="en-US"/>
+            <a:endParaRPr lang="en-US" dirty="0"/>
           </a:p>
         </p:txBody>
       </p:sp>
@@ -1086,9 +1294,9 @@
           <a:p>
             <a:fld id="{1983A999-5E0E-42CA-8400-604AE921FF7C}" type="slidenum">
               <a:rPr lang="en-US" smtClean="0"/>
-              <a:t>13</a:t>
+              <a:t>11</a:t>
             </a:fld>
-            <a:endParaRPr lang="en-US"/>
+            <a:endParaRPr lang="en-US" dirty="0"/>
           </a:p>
         </p:txBody>
       </p:sp>
@@ -1189,7 +1397,7 @@
           <a:lstStyle/>
           <a:p>
             <a:r>
-              <a:rPr lang="en-US"/>
+              <a:rPr lang="en-US" dirty="0"/>
               <a:t>Click icon to add picture</a:t>
             </a:r>
           </a:p>
@@ -1277,7 +1485,7 @@
           <a:lstStyle/>
           <a:p>
             <a:pPr algn="ctr"/>
-            <a:endParaRPr lang="en-US"/>
+            <a:endParaRPr lang="en-US" dirty="0"/>
           </a:p>
         </p:txBody>
       </p:sp>
@@ -1522,7 +1730,7 @@
             <a:lstStyle/>
             <a:p>
               <a:pPr algn="ctr"/>
-              <a:endParaRPr lang="en-US"/>
+              <a:endParaRPr lang="en-US" dirty="0"/>
             </a:p>
           </p:txBody>
         </p:sp>
@@ -1591,7 +1799,7 @@
             <a:lstStyle/>
             <a:p>
               <a:pPr algn="ctr"/>
-              <a:endParaRPr lang="en-US"/>
+              <a:endParaRPr lang="en-US" dirty="0"/>
             </a:p>
           </p:txBody>
         </p:sp>
@@ -2053,7 +2261,7 @@
             <a:lstStyle/>
             <a:p>
               <a:pPr algn="ctr"/>
-              <a:endParaRPr lang="en-US"/>
+              <a:endParaRPr lang="en-US" dirty="0"/>
             </a:p>
           </p:txBody>
         </p:sp>
@@ -2122,7 +2330,7 @@
             <a:lstStyle/>
             <a:p>
               <a:pPr algn="ctr"/>
-              <a:endParaRPr lang="en-US"/>
+              <a:endParaRPr lang="en-US" dirty="0"/>
             </a:p>
           </p:txBody>
         </p:sp>
@@ -2348,7 +2556,7 @@
           <a:lstStyle/>
           <a:p>
             <a:pPr algn="ctr"/>
-            <a:endParaRPr lang="en-US"/>
+            <a:endParaRPr lang="en-US" dirty="0"/>
           </a:p>
         </p:txBody>
       </p:sp>
@@ -2431,7 +2639,7 @@
           <a:lstStyle/>
           <a:p>
             <a:pPr algn="ctr"/>
-            <a:endParaRPr lang="en-US"/>
+            <a:endParaRPr lang="en-US" dirty="0"/>
           </a:p>
         </p:txBody>
       </p:sp>
@@ -2517,7 +2725,7 @@
           <a:lstStyle/>
           <a:p>
             <a:pPr algn="ctr"/>
-            <a:endParaRPr lang="en-US"/>
+            <a:endParaRPr lang="en-US" dirty="0"/>
           </a:p>
         </p:txBody>
       </p:sp>
@@ -3001,10 +3209,9 @@
           <a:lstStyle/>
           <a:p>
             <a:r>
-              <a:rPr lang="en-US"/>
+              <a:rPr lang="en-US" dirty="0"/>
               <a:t>Thursday, May 4th, 2023</a:t>
             </a:r>
-            <a:endParaRPr lang="en-US" dirty="0"/>
           </a:p>
         </p:txBody>
       </p:sp>
@@ -3032,7 +3239,7 @@
           <a:lstStyle/>
           <a:p>
             <a:r>
-              <a:rPr lang="en-US"/>
+              <a:rPr lang="en-US" dirty="0"/>
               <a:t>The Underlying Causes of Diabetes</a:t>
             </a:r>
           </a:p>
@@ -3065,7 +3272,7 @@
               <a:rPr lang="en-US" smtClean="0"/>
               <a:t>‹#›</a:t>
             </a:fld>
-            <a:endParaRPr lang="en-US"/>
+            <a:endParaRPr lang="en-US" dirty="0"/>
           </a:p>
         </p:txBody>
       </p:sp>
@@ -3166,7 +3373,7 @@
           <a:lstStyle/>
           <a:p>
             <a:r>
-              <a:rPr lang="en-US"/>
+              <a:rPr lang="en-US" dirty="0"/>
               <a:t>Click icon to add picture</a:t>
             </a:r>
           </a:p>
@@ -3253,7 +3460,7 @@
           <a:lstStyle/>
           <a:p>
             <a:r>
-              <a:rPr lang="en-US"/>
+              <a:rPr lang="en-US" dirty="0"/>
               <a:t>Thursday, May 4th, 2023</a:t>
             </a:r>
           </a:p>
@@ -3283,7 +3490,7 @@
           <a:lstStyle/>
           <a:p>
             <a:r>
-              <a:rPr lang="en-US"/>
+              <a:rPr lang="en-US" dirty="0"/>
               <a:t>The Underlying Causes of Diabetes</a:t>
             </a:r>
           </a:p>
@@ -3316,7 +3523,7 @@
               <a:rPr lang="en-US" smtClean="0"/>
               <a:t>‹#›</a:t>
             </a:fld>
-            <a:endParaRPr lang="en-US"/>
+            <a:endParaRPr lang="en-US" dirty="0"/>
           </a:p>
         </p:txBody>
       </p:sp>
@@ -3402,7 +3609,7 @@
           <a:lstStyle/>
           <a:p>
             <a:pPr algn="ctr"/>
-            <a:endParaRPr lang="en-US"/>
+            <a:endParaRPr lang="en-US" dirty="0"/>
           </a:p>
         </p:txBody>
       </p:sp>
@@ -3557,10 +3764,9 @@
           <a:lstStyle/>
           <a:p>
             <a:r>
-              <a:rPr lang="en-US"/>
+              <a:rPr lang="en-US" dirty="0"/>
               <a:t>Click icon to add picture</a:t>
             </a:r>
-            <a:endParaRPr lang="en-US" dirty="0"/>
           </a:p>
         </p:txBody>
       </p:sp>
@@ -3596,7 +3802,7 @@
           <a:lstStyle/>
           <a:p>
             <a:r>
-              <a:rPr lang="en-US"/>
+              <a:rPr lang="en-US" dirty="0"/>
               <a:t>Click icon to add picture</a:t>
             </a:r>
           </a:p>
@@ -3777,7 +3983,7 @@
             <a:lstStyle/>
             <a:p>
               <a:pPr algn="ctr"/>
-              <a:endParaRPr lang="en-US">
+              <a:endParaRPr lang="en-US" dirty="0">
                 <a:solidFill>
                   <a:schemeClr val="tx1"/>
                 </a:solidFill>
@@ -3847,7 +4053,7 @@
             <a:lstStyle/>
             <a:p>
               <a:pPr algn="ctr"/>
-              <a:endParaRPr lang="en-US"/>
+              <a:endParaRPr lang="en-US" dirty="0"/>
             </a:p>
           </p:txBody>
         </p:sp>
@@ -4001,7 +4207,7 @@
             <a:lstStyle/>
             <a:p>
               <a:pPr algn="ctr"/>
-              <a:endParaRPr lang="en-US">
+              <a:endParaRPr lang="en-US" dirty="0">
                 <a:solidFill>
                   <a:schemeClr val="tx1"/>
                 </a:solidFill>
@@ -4251,7 +4457,7 @@
             <a:lstStyle/>
             <a:p>
               <a:pPr algn="ctr"/>
-              <a:endParaRPr lang="en-US"/>
+              <a:endParaRPr lang="en-US" dirty="0"/>
             </a:p>
           </p:txBody>
         </p:sp>
@@ -4320,7 +4526,7 @@
             <a:lstStyle/>
             <a:p>
               <a:pPr algn="ctr"/>
-              <a:endParaRPr lang="en-US"/>
+              <a:endParaRPr lang="en-US" dirty="0"/>
             </a:p>
           </p:txBody>
         </p:sp>
@@ -4349,7 +4555,7 @@
           <a:lstStyle/>
           <a:p>
             <a:r>
-              <a:rPr lang="en-US"/>
+              <a:rPr lang="en-US" dirty="0"/>
               <a:t>Thursday, May 4th, 2023</a:t>
             </a:r>
           </a:p>
@@ -4379,7 +4585,7 @@
           <a:lstStyle/>
           <a:p>
             <a:r>
-              <a:rPr lang="en-US"/>
+              <a:rPr lang="en-US" dirty="0"/>
               <a:t>The Underlying Causes of Diabetes</a:t>
             </a:r>
           </a:p>
@@ -4412,7 +4618,7 @@
               <a:rPr lang="en-US" smtClean="0"/>
               <a:t>‹#›</a:t>
             </a:fld>
-            <a:endParaRPr lang="en-US"/>
+            <a:endParaRPr lang="en-US" dirty="0"/>
           </a:p>
         </p:txBody>
       </p:sp>
@@ -4500,7 +4706,7 @@
           <a:lstStyle/>
           <a:p>
             <a:pPr algn="ctr"/>
-            <a:endParaRPr lang="en-US"/>
+            <a:endParaRPr lang="en-US" dirty="0"/>
           </a:p>
         </p:txBody>
       </p:sp>
@@ -4683,10 +4889,9 @@
           <a:lstStyle/>
           <a:p>
             <a:r>
-              <a:rPr lang="en-US"/>
+              <a:rPr lang="en-US" dirty="0"/>
               <a:t>Thursday, May 4th, 2023</a:t>
             </a:r>
-            <a:endParaRPr lang="en-US" dirty="0"/>
           </a:p>
         </p:txBody>
       </p:sp>
@@ -4714,7 +4919,7 @@
           <a:lstStyle/>
           <a:p>
             <a:r>
-              <a:rPr lang="en-US"/>
+              <a:rPr lang="en-US" dirty="0"/>
               <a:t>The Underlying Causes of Diabetes</a:t>
             </a:r>
           </a:p>
@@ -4747,7 +4952,7 @@
               <a:rPr lang="en-US" smtClean="0"/>
               <a:t>‹#›</a:t>
             </a:fld>
-            <a:endParaRPr lang="en-US"/>
+            <a:endParaRPr lang="en-US" dirty="0"/>
           </a:p>
         </p:txBody>
       </p:sp>
@@ -4969,7 +5174,7 @@
           <a:lstStyle/>
           <a:p>
             <a:pPr algn="ctr"/>
-            <a:endParaRPr lang="en-US"/>
+            <a:endParaRPr lang="en-US" dirty="0"/>
           </a:p>
         </p:txBody>
       </p:sp>
@@ -5049,7 +5254,7 @@
           <a:lstStyle/>
           <a:p>
             <a:pPr algn="ctr"/>
-            <a:endParaRPr lang="en-US"/>
+            <a:endParaRPr lang="en-US" dirty="0"/>
           </a:p>
         </p:txBody>
       </p:sp>
@@ -5132,7 +5337,7 @@
           <a:lstStyle/>
           <a:p>
             <a:pPr algn="ctr"/>
-            <a:endParaRPr lang="en-US"/>
+            <a:endParaRPr lang="en-US" dirty="0"/>
           </a:p>
         </p:txBody>
       </p:sp>
@@ -5503,7 +5708,7 @@
             <a:lstStyle/>
             <a:p>
               <a:pPr algn="ctr"/>
-              <a:endParaRPr lang="en-US"/>
+              <a:endParaRPr lang="en-US" dirty="0"/>
             </a:p>
           </p:txBody>
         </p:sp>
@@ -5572,7 +5777,7 @@
             <a:lstStyle/>
             <a:p>
               <a:pPr algn="ctr"/>
-              <a:endParaRPr lang="en-US"/>
+              <a:endParaRPr lang="en-US" dirty="0"/>
             </a:p>
           </p:txBody>
         </p:sp>
@@ -5686,7 +5891,7 @@
           <a:lstStyle/>
           <a:p>
             <a:pPr algn="ctr"/>
-            <a:endParaRPr lang="en-US"/>
+            <a:endParaRPr lang="en-US" dirty="0"/>
           </a:p>
         </p:txBody>
       </p:sp>
@@ -5928,7 +6133,7 @@
             <a:lstStyle/>
             <a:p>
               <a:pPr algn="ctr"/>
-              <a:endParaRPr lang="en-US"/>
+              <a:endParaRPr lang="en-US" dirty="0"/>
             </a:p>
           </p:txBody>
         </p:sp>
@@ -6008,7 +6213,7 @@
             <a:lstStyle/>
             <a:p>
               <a:pPr algn="ctr"/>
-              <a:endParaRPr lang="en-US"/>
+              <a:endParaRPr lang="en-US" dirty="0"/>
             </a:p>
           </p:txBody>
         </p:sp>
@@ -6210,7 +6415,7 @@
           <a:lstStyle/>
           <a:p>
             <a:r>
-              <a:rPr lang="en-US"/>
+              <a:rPr lang="en-US" dirty="0"/>
               <a:t>Thursday, May 4th, 2023</a:t>
             </a:r>
           </a:p>
@@ -6240,7 +6445,7 @@
           <a:lstStyle/>
           <a:p>
             <a:r>
-              <a:rPr lang="en-US"/>
+              <a:rPr lang="en-US" dirty="0"/>
               <a:t>The Underlying Causes of Diabetes</a:t>
             </a:r>
           </a:p>
@@ -6273,7 +6478,7 @@
               <a:rPr lang="en-US" smtClean="0"/>
               <a:t>‹#›</a:t>
             </a:fld>
-            <a:endParaRPr lang="en-US"/>
+            <a:endParaRPr lang="en-US" dirty="0"/>
           </a:p>
         </p:txBody>
       </p:sp>
@@ -6331,7 +6536,7 @@
           <a:lstStyle/>
           <a:p>
             <a:r>
-              <a:rPr lang="en-US"/>
+              <a:rPr lang="en-US" dirty="0"/>
               <a:t>Thursday, May 4th, 2023</a:t>
             </a:r>
           </a:p>
@@ -6361,7 +6566,7 @@
           <a:lstStyle/>
           <a:p>
             <a:r>
-              <a:rPr lang="en-US"/>
+              <a:rPr lang="en-US" dirty="0"/>
               <a:t>The Underlying Causes of Diabetes</a:t>
             </a:r>
           </a:p>
@@ -6394,7 +6599,7 @@
               <a:rPr lang="en-US" smtClean="0"/>
               <a:t>‹#›</a:t>
             </a:fld>
-            <a:endParaRPr lang="en-US"/>
+            <a:endParaRPr lang="en-US" dirty="0"/>
           </a:p>
         </p:txBody>
       </p:sp>
@@ -6666,7 +6871,7 @@
             <a:lstStyle/>
             <a:p>
               <a:pPr algn="ctr"/>
-              <a:endParaRPr lang="en-US"/>
+              <a:endParaRPr lang="en-US" dirty="0"/>
             </a:p>
           </p:txBody>
         </p:sp>
@@ -6746,7 +6951,7 @@
             <a:lstStyle/>
             <a:p>
               <a:pPr algn="ctr"/>
-              <a:endParaRPr lang="en-US"/>
+              <a:endParaRPr lang="en-US" dirty="0"/>
             </a:p>
           </p:txBody>
         </p:sp>
@@ -6984,7 +7189,7 @@
           <a:lstStyle/>
           <a:p>
             <a:r>
-              <a:rPr lang="en-US"/>
+              <a:rPr lang="en-US" dirty="0"/>
               <a:t>Thursday, May 4th, 2023</a:t>
             </a:r>
           </a:p>
@@ -7014,7 +7219,7 @@
           <a:lstStyle/>
           <a:p>
             <a:r>
-              <a:rPr lang="en-US"/>
+              <a:rPr lang="en-US" dirty="0"/>
               <a:t>The Underlying Causes of Diabetes</a:t>
             </a:r>
           </a:p>
@@ -7047,7 +7252,7 @@
               <a:rPr lang="en-US" smtClean="0"/>
               <a:t>‹#›</a:t>
             </a:fld>
-            <a:endParaRPr lang="en-US"/>
+            <a:endParaRPr lang="en-US" dirty="0"/>
           </a:p>
         </p:txBody>
       </p:sp>
@@ -7259,7 +7464,7 @@
           <a:lstStyle/>
           <a:p>
             <a:r>
-              <a:rPr lang="en-US"/>
+              <a:rPr lang="en-US" dirty="0"/>
               <a:t>Click icon to add picture</a:t>
             </a:r>
           </a:p>
@@ -7359,7 +7564,7 @@
           <a:lstStyle/>
           <a:p>
             <a:r>
-              <a:rPr lang="en-US"/>
+              <a:rPr lang="en-US" dirty="0"/>
               <a:t>Click icon to add picture</a:t>
             </a:r>
           </a:p>
@@ -7459,7 +7664,7 @@
           <a:lstStyle/>
           <a:p>
             <a:r>
-              <a:rPr lang="en-US"/>
+              <a:rPr lang="en-US" dirty="0"/>
               <a:t>Click icon to add picture</a:t>
             </a:r>
           </a:p>
@@ -7489,7 +7694,7 @@
           <a:lstStyle/>
           <a:p>
             <a:r>
-              <a:rPr lang="en-US"/>
+              <a:rPr lang="en-US" dirty="0"/>
               <a:t>Thursday, May 4th, 2023</a:t>
             </a:r>
           </a:p>
@@ -7519,7 +7724,7 @@
           <a:lstStyle/>
           <a:p>
             <a:r>
-              <a:rPr lang="en-US"/>
+              <a:rPr lang="en-US" dirty="0"/>
               <a:t>The Underlying Causes of Diabetes</a:t>
             </a:r>
           </a:p>
@@ -7552,7 +7757,7 @@
               <a:rPr lang="en-US" smtClean="0"/>
               <a:t>‹#›</a:t>
             </a:fld>
-            <a:endParaRPr lang="en-US"/>
+            <a:endParaRPr lang="en-US" dirty="0"/>
           </a:p>
         </p:txBody>
       </p:sp>
@@ -7638,7 +7843,7 @@
           <a:lstStyle/>
           <a:p>
             <a:pPr algn="ctr"/>
-            <a:endParaRPr lang="en-US"/>
+            <a:endParaRPr lang="en-US" dirty="0"/>
           </a:p>
         </p:txBody>
       </p:sp>
@@ -7883,7 +8088,7 @@
             <a:lstStyle/>
             <a:p>
               <a:pPr algn="ctr"/>
-              <a:endParaRPr lang="en-US"/>
+              <a:endParaRPr lang="en-US" dirty="0"/>
             </a:p>
           </p:txBody>
         </p:sp>
@@ -8068,7 +8273,7 @@
           <a:lstStyle/>
           <a:p>
             <a:r>
-              <a:rPr lang="en-US"/>
+              <a:rPr lang="en-US" dirty="0"/>
               <a:t>Click icon to add picture</a:t>
             </a:r>
           </a:p>
@@ -8106,7 +8311,7 @@
           <a:lstStyle/>
           <a:p>
             <a:r>
-              <a:rPr lang="en-US"/>
+              <a:rPr lang="en-US" dirty="0"/>
               <a:t>Click icon to add picture</a:t>
             </a:r>
           </a:p>
@@ -8144,7 +8349,7 @@
           <a:lstStyle/>
           <a:p>
             <a:r>
-              <a:rPr lang="en-US"/>
+              <a:rPr lang="en-US" dirty="0"/>
               <a:t>Click icon to add picture</a:t>
             </a:r>
           </a:p>
@@ -8182,7 +8387,7 @@
           <a:lstStyle/>
           <a:p>
             <a:r>
-              <a:rPr lang="en-US"/>
+              <a:rPr lang="en-US" dirty="0"/>
               <a:t>Click icon to add picture</a:t>
             </a:r>
           </a:p>
@@ -8212,7 +8417,7 @@
           <a:lstStyle/>
           <a:p>
             <a:r>
-              <a:rPr lang="en-US"/>
+              <a:rPr lang="en-US" dirty="0"/>
               <a:t>Thursday, May 4th, 2023</a:t>
             </a:r>
           </a:p>
@@ -8242,7 +8447,7 @@
           <a:lstStyle/>
           <a:p>
             <a:r>
-              <a:rPr lang="en-US"/>
+              <a:rPr lang="en-US" dirty="0"/>
               <a:t>The Underlying Causes of Diabetes</a:t>
             </a:r>
           </a:p>
@@ -8275,7 +8480,7 @@
               <a:rPr lang="en-US" smtClean="0"/>
               <a:t>‹#›</a:t>
             </a:fld>
-            <a:endParaRPr lang="en-US"/>
+            <a:endParaRPr lang="en-US" dirty="0"/>
           </a:p>
         </p:txBody>
       </p:sp>
@@ -8405,7 +8610,7 @@
           <a:lstStyle/>
           <a:p>
             <a:r>
-              <a:rPr lang="en-US"/>
+              <a:rPr lang="en-US" dirty="0"/>
               <a:t>Click icon to add picture</a:t>
             </a:r>
           </a:p>
@@ -8433,7 +8638,7 @@
           <a:lstStyle/>
           <a:p>
             <a:r>
-              <a:rPr lang="en-US"/>
+              <a:rPr lang="en-US" dirty="0"/>
               <a:t>Thursday, May 4th, 2023</a:t>
             </a:r>
           </a:p>
@@ -8461,7 +8666,7 @@
           <a:lstStyle/>
           <a:p>
             <a:r>
-              <a:rPr lang="en-US"/>
+              <a:rPr lang="en-US" dirty="0"/>
               <a:t>The Underlying Causes of Diabetes</a:t>
             </a:r>
           </a:p>
@@ -8492,7 +8697,7 @@
               <a:rPr lang="en-US" smtClean="0"/>
               <a:t>‹#›</a:t>
             </a:fld>
-            <a:endParaRPr lang="en-US"/>
+            <a:endParaRPr lang="en-US" dirty="0"/>
           </a:p>
         </p:txBody>
       </p:sp>
@@ -8560,7 +8765,7 @@
           <a:lstStyle/>
           <a:p>
             <a:pPr algn="ctr"/>
-            <a:endParaRPr lang="en-US"/>
+            <a:endParaRPr lang="en-US" dirty="0"/>
           </a:p>
         </p:txBody>
       </p:sp>
@@ -8625,7 +8830,7 @@
           <a:lstStyle/>
           <a:p>
             <a:pPr algn="ctr"/>
-            <a:endParaRPr lang="en-US"/>
+            <a:endParaRPr lang="en-US" dirty="0"/>
           </a:p>
         </p:txBody>
       </p:sp>
@@ -8787,7 +8992,7 @@
           <a:lstStyle/>
           <a:p>
             <a:r>
-              <a:rPr lang="en-US"/>
+              <a:rPr lang="en-US" dirty="0"/>
               <a:t>Click icon to add picture</a:t>
             </a:r>
           </a:p>
@@ -9182,7 +9387,7 @@
             <a:lstStyle/>
             <a:p>
               <a:pPr algn="ctr"/>
-              <a:endParaRPr lang="en-US"/>
+              <a:endParaRPr lang="en-US" dirty="0"/>
             </a:p>
           </p:txBody>
         </p:sp>
@@ -9251,7 +9456,7 @@
             <a:lstStyle/>
             <a:p>
               <a:pPr algn="ctr"/>
-              <a:endParaRPr lang="en-US"/>
+              <a:endParaRPr lang="en-US" dirty="0"/>
             </a:p>
           </p:txBody>
         </p:sp>
@@ -9532,7 +9737,7 @@
           <a:lstStyle/>
           <a:p>
             <a:r>
-              <a:rPr lang="en-US"/>
+              <a:rPr lang="en-US" dirty="0"/>
               <a:t>Thursday, May 4th, 2023</a:t>
             </a:r>
           </a:p>
@@ -9562,7 +9767,7 @@
           <a:lstStyle/>
           <a:p>
             <a:r>
-              <a:rPr lang="en-US"/>
+              <a:rPr lang="en-US" dirty="0"/>
               <a:t>The Underlying Causes of Diabetes</a:t>
             </a:r>
           </a:p>
@@ -9595,7 +9800,7 @@
               <a:rPr lang="en-US" smtClean="0"/>
               <a:t>‹#›</a:t>
             </a:fld>
-            <a:endParaRPr lang="en-US"/>
+            <a:endParaRPr lang="en-US" dirty="0"/>
           </a:p>
         </p:txBody>
       </p:sp>
@@ -9823,7 +10028,7 @@
             <a:lstStyle/>
             <a:p>
               <a:pPr algn="ctr"/>
-              <a:endParaRPr lang="en-US"/>
+              <a:endParaRPr lang="en-US" dirty="0"/>
             </a:p>
           </p:txBody>
         </p:sp>
@@ -9974,7 +10179,7 @@
             <a:lstStyle/>
             <a:p>
               <a:pPr algn="ctr"/>
-              <a:endParaRPr lang="en-US"/>
+              <a:endParaRPr lang="en-US" dirty="0"/>
             </a:p>
           </p:txBody>
         </p:sp>
@@ -10126,7 +10331,7 @@
             <a:lstStyle/>
             <a:p>
               <a:pPr algn="ctr"/>
-              <a:endParaRPr lang="en-US"/>
+              <a:endParaRPr lang="en-US" dirty="0"/>
             </a:p>
           </p:txBody>
         </p:sp>
@@ -10215,7 +10420,7 @@
           <a:lstStyle/>
           <a:p>
             <a:pPr algn="ctr"/>
-            <a:endParaRPr lang="en-US"/>
+            <a:endParaRPr lang="en-US" dirty="0"/>
           </a:p>
         </p:txBody>
       </p:sp>
@@ -10366,7 +10571,7 @@
           <a:lstStyle/>
           <a:p>
             <a:r>
-              <a:rPr lang="en-US"/>
+              <a:rPr lang="en-US" dirty="0"/>
               <a:t>Click icon to add picture</a:t>
             </a:r>
           </a:p>
@@ -10396,7 +10601,7 @@
           <a:lstStyle/>
           <a:p>
             <a:r>
-              <a:rPr lang="en-US"/>
+              <a:rPr lang="en-US" dirty="0"/>
               <a:t>Thursday, May 4th, 2023</a:t>
             </a:r>
           </a:p>
@@ -10426,7 +10631,7 @@
           <a:lstStyle/>
           <a:p>
             <a:r>
-              <a:rPr lang="en-US"/>
+              <a:rPr lang="en-US" dirty="0"/>
               <a:t>The Underlying Causes of Diabetes</a:t>
             </a:r>
           </a:p>
@@ -10459,7 +10664,7 @@
               <a:rPr lang="en-US" smtClean="0"/>
               <a:t>‹#›</a:t>
             </a:fld>
-            <a:endParaRPr lang="en-US"/>
+            <a:endParaRPr lang="en-US" dirty="0"/>
           </a:p>
         </p:txBody>
       </p:sp>
@@ -10559,7 +10764,7 @@
           <a:lstStyle/>
           <a:p>
             <a:pPr algn="ctr"/>
-            <a:endParaRPr lang="en-US"/>
+            <a:endParaRPr lang="en-US" dirty="0"/>
           </a:p>
         </p:txBody>
       </p:sp>
@@ -10647,7 +10852,7 @@
           <a:lstStyle/>
           <a:p>
             <a:pPr algn="ctr"/>
-            <a:endParaRPr lang="en-US"/>
+            <a:endParaRPr lang="en-US" dirty="0"/>
           </a:p>
         </p:txBody>
       </p:sp>
@@ -10845,7 +11050,7 @@
             <a:lstStyle/>
             <a:p>
               <a:pPr algn="ctr"/>
-              <a:endParaRPr lang="en-US"/>
+              <a:endParaRPr lang="en-US" dirty="0"/>
             </a:p>
           </p:txBody>
         </p:sp>
@@ -10983,7 +11188,7 @@
             <a:lstStyle/>
             <a:p>
               <a:pPr algn="ctr"/>
-              <a:endParaRPr lang="en-US">
+              <a:endParaRPr lang="en-US" dirty="0">
                 <a:solidFill>
                   <a:schemeClr val="tx1"/>
                 </a:solidFill>
@@ -11056,7 +11261,7 @@
             <a:lstStyle/>
             <a:p>
               <a:pPr algn="ctr"/>
-              <a:endParaRPr lang="en-US"/>
+              <a:endParaRPr lang="en-US" dirty="0"/>
             </a:p>
           </p:txBody>
         </p:sp>
@@ -11125,7 +11330,7 @@
             <a:lstStyle/>
             <a:p>
               <a:pPr algn="ctr"/>
-              <a:endParaRPr lang="en-US"/>
+              <a:endParaRPr lang="en-US" dirty="0"/>
             </a:p>
           </p:txBody>
         </p:sp>
@@ -11162,7 +11367,7 @@
           <a:lstStyle/>
           <a:p>
             <a:r>
-              <a:rPr lang="en-US"/>
+              <a:rPr lang="en-US" dirty="0"/>
               <a:t>Click icon to add picture</a:t>
             </a:r>
           </a:p>
@@ -11200,7 +11405,7 @@
           <a:lstStyle/>
           <a:p>
             <a:r>
-              <a:rPr lang="en-US"/>
+              <a:rPr lang="en-US" dirty="0"/>
               <a:t>Click icon to add picture</a:t>
             </a:r>
           </a:p>
@@ -11238,10 +11443,9 @@
           <a:lstStyle/>
           <a:p>
             <a:r>
-              <a:rPr lang="en-US"/>
+              <a:rPr lang="en-US" dirty="0"/>
               <a:t>Click icon to add picture</a:t>
             </a:r>
-            <a:endParaRPr lang="en-US" dirty="0"/>
           </a:p>
         </p:txBody>
       </p:sp>
@@ -11277,7 +11481,7 @@
           <a:lstStyle/>
           <a:p>
             <a:r>
-              <a:rPr lang="en-US"/>
+              <a:rPr lang="en-US" dirty="0"/>
               <a:t>Click icon to add picture</a:t>
             </a:r>
           </a:p>
@@ -11635,10 +11839,9 @@
           <a:lstStyle/>
           <a:p>
             <a:r>
-              <a:rPr lang="en-US"/>
+              <a:rPr lang="en-US" dirty="0"/>
               <a:t>Thursday, May 4th, 2023</a:t>
             </a:r>
-            <a:endParaRPr lang="en-US" dirty="0"/>
           </a:p>
         </p:txBody>
       </p:sp>
@@ -11666,7 +11869,7 @@
           <a:lstStyle/>
           <a:p>
             <a:r>
-              <a:rPr lang="en-US"/>
+              <a:rPr lang="en-US" dirty="0"/>
               <a:t>The Underlying Causes of Diabetes</a:t>
             </a:r>
           </a:p>
@@ -11699,7 +11902,7 @@
               <a:rPr lang="en-US" smtClean="0"/>
               <a:t>‹#›</a:t>
             </a:fld>
-            <a:endParaRPr lang="en-US"/>
+            <a:endParaRPr lang="en-US" dirty="0"/>
           </a:p>
         </p:txBody>
       </p:sp>
@@ -11812,7 +12015,7 @@
           <a:lstStyle/>
           <a:p>
             <a:pPr algn="ctr"/>
-            <a:endParaRPr lang="en-US"/>
+            <a:endParaRPr lang="en-US" dirty="0"/>
           </a:p>
         </p:txBody>
       </p:sp>
@@ -11868,7 +12071,7 @@
           <a:lstStyle/>
           <a:p>
             <a:pPr algn="ctr"/>
-            <a:endParaRPr lang="en-US"/>
+            <a:endParaRPr lang="en-US" dirty="0"/>
           </a:p>
         </p:txBody>
       </p:sp>
@@ -12225,7 +12428,7 @@
           <a:lstStyle/>
           <a:p>
             <a:r>
-              <a:rPr lang="en-US"/>
+              <a:rPr lang="en-US" dirty="0"/>
               <a:t>Thursday, May 4th, 2023</a:t>
             </a:r>
           </a:p>
@@ -12255,7 +12458,7 @@
           <a:lstStyle/>
           <a:p>
             <a:r>
-              <a:rPr lang="en-US"/>
+              <a:rPr lang="en-US" dirty="0"/>
               <a:t>The Underlying Causes of Diabetes</a:t>
             </a:r>
           </a:p>
@@ -12288,7 +12491,7 @@
               <a:rPr lang="en-US" smtClean="0"/>
               <a:t>‹#›</a:t>
             </a:fld>
-            <a:endParaRPr lang="en-US"/>
+            <a:endParaRPr lang="en-US" dirty="0"/>
           </a:p>
         </p:txBody>
       </p:sp>
@@ -12482,10 +12685,9 @@
           </a:lstStyle>
           <a:p>
             <a:r>
-              <a:rPr lang="en-US"/>
+              <a:rPr lang="en-US" dirty="0"/>
               <a:t>Thursday, May 4th, 2023</a:t>
             </a:r>
-            <a:endParaRPr lang="en-US" dirty="0"/>
           </a:p>
         </p:txBody>
       </p:sp>
@@ -12532,10 +12734,9 @@
           </a:lstStyle>
           <a:p>
             <a:r>
-              <a:rPr lang="en-US"/>
+              <a:rPr lang="en-US" dirty="0"/>
               <a:t>The Underlying Causes of Diabetes</a:t>
             </a:r>
-            <a:endParaRPr lang="en-US" dirty="0"/>
           </a:p>
         </p:txBody>
       </p:sp>
@@ -12586,7 +12787,7 @@
               <a:pPr/>
               <a:t>‹#›</a:t>
             </a:fld>
-            <a:endParaRPr lang="en-US"/>
+            <a:endParaRPr lang="en-US" dirty="0"/>
           </a:p>
         </p:txBody>
       </p:sp>
@@ -13557,18 +13758,13 @@
                 <a:latin typeface="Times New Roman" panose="02020603050405020304" pitchFamily="18" charset="0"/>
                 <a:cs typeface="Times New Roman" panose="02020603050405020304" pitchFamily="18" charset="0"/>
               </a:rPr>
-              <a:t>Charles </a:t>
-            </a:r>
-            <a:r>
-              <a:rPr lang="en-US" sz="5600" dirty="0" err="1">
-                <a:solidFill>
-                  <a:srgbClr val="FF6600"/>
-                </a:solidFill>
-                <a:latin typeface="Times New Roman" panose="02020603050405020304" pitchFamily="18" charset="0"/>
-                <a:cs typeface="Times New Roman" panose="02020603050405020304" pitchFamily="18" charset="0"/>
-              </a:rPr>
-              <a:t>Descheneaux</a:t>
-            </a:r>
+              <a:t>Charles Descheneaux </a:t>
+            </a:r>
+          </a:p>
+          <a:p>
+            <a:pPr marL="0" indent="0" algn="ctr">
+              <a:buNone/>
+            </a:pPr>
             <a:r>
               <a:rPr lang="en-US" sz="5600" dirty="0">
                 <a:solidFill>
@@ -13577,40 +13773,8 @@
                 <a:latin typeface="Times New Roman" panose="02020603050405020304" pitchFamily="18" charset="0"/>
                 <a:cs typeface="Times New Roman" panose="02020603050405020304" pitchFamily="18" charset="0"/>
               </a:rPr>
-              <a:t> </a:t>
-            </a:r>
-          </a:p>
-          <a:p>
-            <a:pPr marL="0" indent="0" algn="ctr">
-              <a:buNone/>
-            </a:pPr>
-            <a:r>
-              <a:rPr lang="en-US" sz="5600" dirty="0">
-                <a:solidFill>
-                  <a:srgbClr val="FF6600"/>
-                </a:solidFill>
-                <a:latin typeface="Times New Roman" panose="02020603050405020304" pitchFamily="18" charset="0"/>
-                <a:cs typeface="Times New Roman" panose="02020603050405020304" pitchFamily="18" charset="0"/>
-              </a:rPr>
-              <a:t>Justin </a:t>
-            </a:r>
-            <a:r>
-              <a:rPr lang="en-US" sz="5600" dirty="0" err="1">
-                <a:solidFill>
-                  <a:srgbClr val="FF6600"/>
-                </a:solidFill>
-                <a:latin typeface="Times New Roman" panose="02020603050405020304" pitchFamily="18" charset="0"/>
-                <a:cs typeface="Times New Roman" panose="02020603050405020304" pitchFamily="18" charset="0"/>
-              </a:rPr>
-              <a:t>Mangaroo</a:t>
-            </a:r>
-            <a:endParaRPr lang="en-US" sz="5600" dirty="0">
-              <a:solidFill>
-                <a:srgbClr val="FF6600"/>
-              </a:solidFill>
-              <a:latin typeface="Times New Roman" panose="02020603050405020304" pitchFamily="18" charset="0"/>
-              <a:cs typeface="Times New Roman" panose="02020603050405020304" pitchFamily="18" charset="0"/>
-            </a:endParaRPr>
+              <a:t>Justin Mangaroo</a:t>
+            </a:r>
           </a:p>
           <a:p>
             <a:pPr marL="0" indent="0" algn="ctr">
@@ -13914,7 +14078,7 @@
         <p:spPr>
           <a:xfrm>
             <a:off x="550861" y="549275"/>
-            <a:ext cx="11448481" cy="3870325"/>
+            <a:ext cx="11448481" cy="770567"/>
           </a:xfrm>
         </p:spPr>
         <p:txBody>
@@ -13922,21 +14086,17 @@
           <a:lstStyle/>
           <a:p>
             <a:pPr algn="ctr"/>
-            <a:r>
-              <a:rPr lang="en-US" sz="4000" dirty="0"/>
-              <a:t>Glycosylated Hgb( </a:t>
-            </a:r>
             <a:r>
               <a:rPr lang="en-US" sz="4000" dirty="0">
                 <a:solidFill>
                   <a:srgbClr val="FF6600"/>
                 </a:solidFill>
               </a:rPr>
-              <a:t>A1C</a:t>
+              <a:t>Smoking</a:t>
             </a:r>
             <a:r>
               <a:rPr lang="en-US" sz="4000" dirty="0"/>
-              <a:t>): Males Vs. Female - Age </a:t>
+              <a:t>: Males Vs. Female - Age </a:t>
             </a:r>
             <a:r>
               <a:rPr lang="en-US" sz="4000" u="sng" dirty="0"/>
@@ -13976,7 +14136,7 @@
           <a:lstStyle/>
           <a:p>
             <a:r>
-              <a:rPr lang="en-US"/>
+              <a:rPr lang="en-US" dirty="0"/>
               <a:t>Thursday, May 4th, 2023</a:t>
             </a:r>
           </a:p>
@@ -14010,10 +14170,9 @@
           <a:p>
             <a:pPr algn="ctr"/>
             <a:r>
-              <a:rPr lang="en-US"/>
+              <a:rPr lang="en-US" dirty="0"/>
               <a:t>The Underlying Causes of Diabetes</a:t>
             </a:r>
-            <a:endParaRPr lang="en-US" dirty="0"/>
           </a:p>
         </p:txBody>
       </p:sp>
@@ -14048,824 +14207,7 @@
               <a:pPr/>
               <a:t>10</a:t>
             </a:fld>
-            <a:endParaRPr lang="en-US"/>
-          </a:p>
-        </p:txBody>
-      </p:sp>
-      <p:pic>
-        <p:nvPicPr>
-          <p:cNvPr id="5" name="Content Placeholder 4">
-            <a:extLst>
-              <a:ext uri="{FF2B5EF4-FFF2-40B4-BE49-F238E27FC236}">
-                <a16:creationId xmlns:a16="http://schemas.microsoft.com/office/drawing/2014/main" id="{A68F42F7-B281-758E-FE66-BDBF178F45D5}"/>
-              </a:ext>
-            </a:extLst>
-          </p:cNvPr>
-          <p:cNvPicPr>
-            <a:picLocks noGrp="1" noChangeAspect="1"/>
-          </p:cNvPicPr>
-          <p:nvPr>
-            <p:ph idx="1"/>
-          </p:nvPr>
-        </p:nvPicPr>
-        <p:blipFill>
-          <a:blip r:embed="rId2"/>
-          <a:stretch>
-            <a:fillRect/>
-          </a:stretch>
-        </p:blipFill>
-        <p:spPr>
-          <a:xfrm>
-            <a:off x="539763" y="1096814"/>
-            <a:ext cx="3838581" cy="2791696"/>
-          </a:xfrm>
-        </p:spPr>
-      </p:pic>
-      <p:pic>
-        <p:nvPicPr>
-          <p:cNvPr id="7" name="Picture 6">
-            <a:extLst>
-              <a:ext uri="{FF2B5EF4-FFF2-40B4-BE49-F238E27FC236}">
-                <a16:creationId xmlns:a16="http://schemas.microsoft.com/office/drawing/2014/main" id="{957559BC-152B-458C-E602-6E1AA3A5B674}"/>
-              </a:ext>
-            </a:extLst>
-          </p:cNvPr>
-          <p:cNvPicPr>
-            <a:picLocks noChangeAspect="1"/>
-          </p:cNvPicPr>
-          <p:nvPr/>
-        </p:nvPicPr>
-        <p:blipFill>
-          <a:blip r:embed="rId3"/>
-          <a:stretch>
-            <a:fillRect/>
-          </a:stretch>
-        </p:blipFill>
-        <p:spPr>
-          <a:xfrm>
-            <a:off x="8337481" y="1096814"/>
-            <a:ext cx="3672959" cy="2791696"/>
-          </a:xfrm>
-          <a:prstGeom prst="rect">
-            <a:avLst/>
-          </a:prstGeom>
-        </p:spPr>
-      </p:pic>
-      <p:pic>
-        <p:nvPicPr>
-          <p:cNvPr id="9" name="Picture 8">
-            <a:extLst>
-              <a:ext uri="{FF2B5EF4-FFF2-40B4-BE49-F238E27FC236}">
-                <a16:creationId xmlns:a16="http://schemas.microsoft.com/office/drawing/2014/main" id="{0F9CC8E3-18D4-16CD-DC66-C6E4BD11431C}"/>
-              </a:ext>
-            </a:extLst>
-          </p:cNvPr>
-          <p:cNvPicPr>
-            <a:picLocks noChangeAspect="1"/>
-          </p:cNvPicPr>
-          <p:nvPr/>
-        </p:nvPicPr>
-        <p:blipFill>
-          <a:blip r:embed="rId4"/>
-          <a:stretch>
-            <a:fillRect/>
-          </a:stretch>
-        </p:blipFill>
-        <p:spPr>
-          <a:xfrm>
-            <a:off x="8337481" y="3922684"/>
-            <a:ext cx="3661861" cy="2803904"/>
-          </a:xfrm>
-          <a:prstGeom prst="rect">
-            <a:avLst/>
-          </a:prstGeom>
-        </p:spPr>
-      </p:pic>
-      <p:pic>
-        <p:nvPicPr>
-          <p:cNvPr id="11" name="Picture 10">
-            <a:extLst>
-              <a:ext uri="{FF2B5EF4-FFF2-40B4-BE49-F238E27FC236}">
-                <a16:creationId xmlns:a16="http://schemas.microsoft.com/office/drawing/2014/main" id="{818D6AE0-469E-12EE-378D-BBF1D2D9B3B1}"/>
-              </a:ext>
-            </a:extLst>
-          </p:cNvPr>
-          <p:cNvPicPr>
-            <a:picLocks noChangeAspect="1"/>
-          </p:cNvPicPr>
-          <p:nvPr/>
-        </p:nvPicPr>
-        <p:blipFill>
-          <a:blip r:embed="rId5"/>
-          <a:stretch>
-            <a:fillRect/>
-          </a:stretch>
-        </p:blipFill>
-        <p:spPr>
-          <a:xfrm>
-            <a:off x="539920" y="3922684"/>
-            <a:ext cx="3827483" cy="2905122"/>
-          </a:xfrm>
-          <a:prstGeom prst="rect">
-            <a:avLst/>
-          </a:prstGeom>
-        </p:spPr>
-      </p:pic>
-      <p:sp>
-        <p:nvSpPr>
-          <p:cNvPr id="3" name="TextBox 2">
-            <a:extLst>
-              <a:ext uri="{FF2B5EF4-FFF2-40B4-BE49-F238E27FC236}">
-                <a16:creationId xmlns:a16="http://schemas.microsoft.com/office/drawing/2014/main" id="{AEF48555-C636-995C-6614-5D5A7B3E5FB2}"/>
-              </a:ext>
-            </a:extLst>
-          </p:cNvPr>
-          <p:cNvSpPr txBox="1"/>
-          <p:nvPr/>
-        </p:nvSpPr>
-        <p:spPr>
-          <a:xfrm>
-            <a:off x="4589929" y="1362635"/>
-            <a:ext cx="3603812" cy="3970318"/>
-          </a:xfrm>
-          <a:prstGeom prst="rect">
-            <a:avLst/>
-          </a:prstGeom>
-          <a:noFill/>
-        </p:spPr>
-        <p:txBody>
-          <a:bodyPr wrap="square" rtlCol="0">
-            <a:spAutoFit/>
-          </a:bodyPr>
-          <a:lstStyle/>
-          <a:p>
-            <a:r>
-              <a:rPr lang="en-US" dirty="0"/>
-              <a:t>Mean: Female Non-Diabetics 5.39</a:t>
-            </a:r>
-          </a:p>
-          <a:p>
-            <a:r>
-              <a:rPr lang="en-US" dirty="0"/>
-              <a:t>Mean: Female Diabetics 6.94</a:t>
-            </a:r>
-          </a:p>
-          <a:p>
-            <a:r>
-              <a:rPr lang="en-US" dirty="0" err="1"/>
-              <a:t>Ttest</a:t>
-            </a:r>
-            <a:r>
-              <a:rPr lang="en-US" dirty="0"/>
-              <a:t> statistic: 89.72 p-value =0.00</a:t>
-            </a:r>
-          </a:p>
-          <a:p>
             <a:endParaRPr lang="en-US" dirty="0"/>
-          </a:p>
-          <a:p>
-            <a:endParaRPr lang="en-US" dirty="0"/>
-          </a:p>
-          <a:p>
-            <a:r>
-              <a:rPr lang="en-US" dirty="0"/>
-              <a:t>Mean: Male Non-Diabetics 5.40</a:t>
-            </a:r>
-          </a:p>
-          <a:p>
-            <a:r>
-              <a:rPr lang="en-US" dirty="0"/>
-              <a:t>Mean: Male Diabetics 6.93</a:t>
-            </a:r>
-          </a:p>
-          <a:p>
-            <a:r>
-              <a:rPr lang="en-US" dirty="0" err="1"/>
-              <a:t>Ttest</a:t>
-            </a:r>
-            <a:r>
-              <a:rPr lang="en-US" dirty="0"/>
-              <a:t> statistic: 122.64 p-value=0.00</a:t>
-            </a:r>
-          </a:p>
-          <a:p>
-            <a:endParaRPr lang="en-US" dirty="0"/>
-          </a:p>
-          <a:p>
-            <a:r>
-              <a:rPr lang="en-US" dirty="0"/>
-              <a:t>This shows the AIC in males vs. females is almost identical, however there is a statistically significant difference between the diabetics and non-diabetics.</a:t>
-            </a:r>
-          </a:p>
-        </p:txBody>
-      </p:sp>
-    </p:spTree>
-    <p:extLst>
-      <p:ext uri="{BB962C8B-B14F-4D97-AF65-F5344CB8AC3E}">
-        <p14:creationId xmlns:p14="http://schemas.microsoft.com/office/powerpoint/2010/main" val="4155905521"/>
-      </p:ext>
-    </p:extLst>
-  </p:cSld>
-  <p:clrMapOvr>
-    <a:masterClrMapping/>
-  </p:clrMapOvr>
-  <mc:AlternateContent xmlns:mc="http://schemas.openxmlformats.org/markup-compatibility/2006" xmlns:p14="http://schemas.microsoft.com/office/powerpoint/2010/main">
-    <mc:Choice Requires="p14">
-      <p:transition spd="slow" p14:dur="3000">
-        <p:comb/>
-      </p:transition>
-    </mc:Choice>
-    <mc:Fallback xmlns="">
-      <p:transition spd="slow">
-        <p:comb/>
-      </p:transition>
-    </mc:Fallback>
-  </mc:AlternateContent>
-</p:sld>
-</file>
-
-<file path=ppt/slides/slide11.xml><?xml version="1.0" encoding="utf-8"?>
-<p:sld xmlns:a="http://schemas.openxmlformats.org/drawingml/2006/main" xmlns:r="http://schemas.openxmlformats.org/officeDocument/2006/relationships" xmlns:p="http://schemas.openxmlformats.org/presentationml/2006/main">
-  <p:cSld>
-    <p:spTree>
-      <p:nvGrpSpPr>
-        <p:cNvPr id="1" name=""/>
-        <p:cNvGrpSpPr/>
-        <p:nvPr/>
-      </p:nvGrpSpPr>
-      <p:grpSpPr>
-        <a:xfrm>
-          <a:off x="0" y="0"/>
-          <a:ext cx="0" cy="0"/>
-          <a:chOff x="0" y="0"/>
-          <a:chExt cx="0" cy="0"/>
-        </a:xfrm>
-      </p:grpSpPr>
-      <p:sp>
-        <p:nvSpPr>
-          <p:cNvPr id="2" name="Title 1">
-            <a:extLst>
-              <a:ext uri="{FF2B5EF4-FFF2-40B4-BE49-F238E27FC236}">
-                <a16:creationId xmlns:a16="http://schemas.microsoft.com/office/drawing/2014/main" id="{FCB102D8-1D22-4940-AF19-07CF3A0DC5F4}"/>
-              </a:ext>
-            </a:extLst>
-          </p:cNvPr>
-          <p:cNvSpPr>
-            <a:spLocks noGrp="1"/>
-          </p:cNvSpPr>
-          <p:nvPr>
-            <p:ph type="title"/>
-          </p:nvPr>
-        </p:nvSpPr>
-        <p:spPr>
-          <a:xfrm>
-            <a:off x="550861" y="549275"/>
-            <a:ext cx="11448481" cy="770567"/>
-          </a:xfrm>
-        </p:spPr>
-        <p:txBody>
-          <a:bodyPr/>
-          <a:lstStyle/>
-          <a:p>
-            <a:pPr algn="ctr"/>
-            <a:r>
-              <a:rPr lang="en-US" sz="4000" dirty="0"/>
-              <a:t>Blood Glucose(</a:t>
-            </a:r>
-            <a:r>
-              <a:rPr lang="en-US" sz="4000" dirty="0">
-                <a:solidFill>
-                  <a:srgbClr val="FF6600"/>
-                </a:solidFill>
-              </a:rPr>
-              <a:t>GLU</a:t>
-            </a:r>
-            <a:r>
-              <a:rPr lang="en-US" sz="4000" dirty="0"/>
-              <a:t>):Males Vs. Female - Age </a:t>
-            </a:r>
-            <a:r>
-              <a:rPr lang="en-US" sz="4000" u="sng" dirty="0"/>
-              <a:t>&gt;</a:t>
-            </a:r>
-            <a:r>
-              <a:rPr lang="en-US" sz="4000" dirty="0"/>
-              <a:t> 30</a:t>
-            </a:r>
-          </a:p>
-        </p:txBody>
-      </p:sp>
-      <p:sp>
-        <p:nvSpPr>
-          <p:cNvPr id="14" name="Date Placeholder 13">
-            <a:extLst>
-              <a:ext uri="{FF2B5EF4-FFF2-40B4-BE49-F238E27FC236}">
-                <a16:creationId xmlns:a16="http://schemas.microsoft.com/office/drawing/2014/main" id="{DC738669-5750-45EA-9715-A0041D4C569B}"/>
-              </a:ext>
-            </a:extLst>
-          </p:cNvPr>
-          <p:cNvSpPr>
-            <a:spLocks noGrp="1"/>
-          </p:cNvSpPr>
-          <p:nvPr>
-            <p:ph type="dt" sz="half" idx="10"/>
-          </p:nvPr>
-        </p:nvSpPr>
-        <p:spPr>
-          <a:xfrm>
-            <a:off x="550863" y="6507212"/>
-            <a:ext cx="2628900" cy="153888"/>
-          </a:xfrm>
-        </p:spPr>
-        <p:txBody>
-          <a:bodyPr/>
-          <a:lstStyle/>
-          <a:p>
-            <a:r>
-              <a:rPr lang="en-US"/>
-              <a:t>Thursday, May 4th, 2023</a:t>
-            </a:r>
-          </a:p>
-        </p:txBody>
-      </p:sp>
-      <p:sp>
-        <p:nvSpPr>
-          <p:cNvPr id="15" name="Footer Placeholder 14">
-            <a:extLst>
-              <a:ext uri="{FF2B5EF4-FFF2-40B4-BE49-F238E27FC236}">
-                <a16:creationId xmlns:a16="http://schemas.microsoft.com/office/drawing/2014/main" id="{CD05A243-8080-4F6D-8538-65CDDF891BA6}"/>
-              </a:ext>
-            </a:extLst>
-          </p:cNvPr>
-          <p:cNvSpPr>
-            <a:spLocks noGrp="1"/>
-          </p:cNvSpPr>
-          <p:nvPr>
-            <p:ph type="ftr" sz="quarter" idx="11"/>
-          </p:nvPr>
-        </p:nvSpPr>
-        <p:spPr>
-          <a:xfrm>
-            <a:off x="3359150" y="6507212"/>
-            <a:ext cx="6379210" cy="153888"/>
-          </a:xfrm>
-        </p:spPr>
-        <p:txBody>
-          <a:bodyPr/>
-          <a:lstStyle/>
-          <a:p>
-            <a:pPr algn="ctr"/>
-            <a:r>
-              <a:rPr lang="en-US"/>
-              <a:t>The Underlying Causes of Diabetes</a:t>
-            </a:r>
-            <a:endParaRPr lang="en-US" dirty="0"/>
-          </a:p>
-        </p:txBody>
-      </p:sp>
-      <p:sp>
-        <p:nvSpPr>
-          <p:cNvPr id="16" name="Slide Number Placeholder 15">
-            <a:extLst>
-              <a:ext uri="{FF2B5EF4-FFF2-40B4-BE49-F238E27FC236}">
-                <a16:creationId xmlns:a16="http://schemas.microsoft.com/office/drawing/2014/main" id="{3F8A62C8-5437-4C47-AC0F-0605F84CBA57}"/>
-              </a:ext>
-            </a:extLst>
-          </p:cNvPr>
-          <p:cNvSpPr>
-            <a:spLocks noGrp="1"/>
-          </p:cNvSpPr>
-          <p:nvPr>
-            <p:ph type="sldNum" sz="quarter" idx="12"/>
-          </p:nvPr>
-        </p:nvSpPr>
-        <p:spPr>
-          <a:xfrm>
-            <a:off x="9948863" y="6507212"/>
-            <a:ext cx="1692274" cy="153888"/>
-          </a:xfrm>
-        </p:spPr>
-        <p:txBody>
-          <a:bodyPr/>
-          <a:lstStyle/>
-          <a:p>
-            <a:fld id="{DBA1B0FB-D917-4C8C-928F-313BD683BF39}" type="slidenum">
-              <a:rPr lang="en-US" smtClean="0"/>
-              <a:pPr/>
-              <a:t>11</a:t>
-            </a:fld>
-            <a:endParaRPr lang="en-US"/>
-          </a:p>
-        </p:txBody>
-      </p:sp>
-      <p:pic>
-        <p:nvPicPr>
-          <p:cNvPr id="5" name="Content Placeholder 4">
-            <a:extLst>
-              <a:ext uri="{FF2B5EF4-FFF2-40B4-BE49-F238E27FC236}">
-                <a16:creationId xmlns:a16="http://schemas.microsoft.com/office/drawing/2014/main" id="{761D4508-2D2B-705E-D9B4-7E8D2BD798BB}"/>
-              </a:ext>
-            </a:extLst>
-          </p:cNvPr>
-          <p:cNvPicPr>
-            <a:picLocks noGrp="1" noChangeAspect="1"/>
-          </p:cNvPicPr>
-          <p:nvPr>
-            <p:ph idx="1"/>
-          </p:nvPr>
-        </p:nvPicPr>
-        <p:blipFill>
-          <a:blip r:embed="rId2"/>
-          <a:stretch>
-            <a:fillRect/>
-          </a:stretch>
-        </p:blipFill>
-        <p:spPr>
-          <a:xfrm>
-            <a:off x="235979" y="3779534"/>
-            <a:ext cx="3791077" cy="2740025"/>
-          </a:xfrm>
-        </p:spPr>
-      </p:pic>
-      <p:pic>
-        <p:nvPicPr>
-          <p:cNvPr id="7" name="Picture 6">
-            <a:extLst>
-              <a:ext uri="{FF2B5EF4-FFF2-40B4-BE49-F238E27FC236}">
-                <a16:creationId xmlns:a16="http://schemas.microsoft.com/office/drawing/2014/main" id="{A57FBBE4-D51D-AD78-36D3-68CF2347BA4D}"/>
-              </a:ext>
-            </a:extLst>
-          </p:cNvPr>
-          <p:cNvPicPr>
-            <a:picLocks noChangeAspect="1"/>
-          </p:cNvPicPr>
-          <p:nvPr/>
-        </p:nvPicPr>
-        <p:blipFill>
-          <a:blip r:embed="rId3"/>
-          <a:stretch>
-            <a:fillRect/>
-          </a:stretch>
-        </p:blipFill>
-        <p:spPr>
-          <a:xfrm>
-            <a:off x="232088" y="1010566"/>
-            <a:ext cx="3794968" cy="2661790"/>
-          </a:xfrm>
-          <a:prstGeom prst="rect">
-            <a:avLst/>
-          </a:prstGeom>
-        </p:spPr>
-      </p:pic>
-      <p:pic>
-        <p:nvPicPr>
-          <p:cNvPr id="9" name="Picture 8">
-            <a:extLst>
-              <a:ext uri="{FF2B5EF4-FFF2-40B4-BE49-F238E27FC236}">
-                <a16:creationId xmlns:a16="http://schemas.microsoft.com/office/drawing/2014/main" id="{3522DB7B-AD6F-DE6A-1811-D829C323EB9A}"/>
-              </a:ext>
-            </a:extLst>
-          </p:cNvPr>
-          <p:cNvPicPr>
-            <a:picLocks noChangeAspect="1"/>
-          </p:cNvPicPr>
-          <p:nvPr/>
-        </p:nvPicPr>
-        <p:blipFill>
-          <a:blip r:embed="rId4"/>
-          <a:stretch>
-            <a:fillRect/>
-          </a:stretch>
-        </p:blipFill>
-        <p:spPr>
-          <a:xfrm>
-            <a:off x="8164946" y="1133512"/>
-            <a:ext cx="3699696" cy="2646022"/>
-          </a:xfrm>
-          <a:prstGeom prst="rect">
-            <a:avLst/>
-          </a:prstGeom>
-        </p:spPr>
-      </p:pic>
-      <p:pic>
-        <p:nvPicPr>
-          <p:cNvPr id="11" name="Picture 10">
-            <a:extLst>
-              <a:ext uri="{FF2B5EF4-FFF2-40B4-BE49-F238E27FC236}">
-                <a16:creationId xmlns:a16="http://schemas.microsoft.com/office/drawing/2014/main" id="{FA262FEB-97C7-58B8-6F81-8E1662A4D352}"/>
-              </a:ext>
-            </a:extLst>
-          </p:cNvPr>
-          <p:cNvPicPr>
-            <a:picLocks noChangeAspect="1"/>
-          </p:cNvPicPr>
-          <p:nvPr/>
-        </p:nvPicPr>
-        <p:blipFill>
-          <a:blip r:embed="rId5"/>
-          <a:stretch>
-            <a:fillRect/>
-          </a:stretch>
-        </p:blipFill>
-        <p:spPr>
-          <a:xfrm>
-            <a:off x="8164946" y="3891301"/>
-            <a:ext cx="3699696" cy="2692855"/>
-          </a:xfrm>
-          <a:prstGeom prst="rect">
-            <a:avLst/>
-          </a:prstGeom>
-        </p:spPr>
-      </p:pic>
-      <p:sp>
-        <p:nvSpPr>
-          <p:cNvPr id="4" name="TextBox 3">
-            <a:extLst>
-              <a:ext uri="{FF2B5EF4-FFF2-40B4-BE49-F238E27FC236}">
-                <a16:creationId xmlns:a16="http://schemas.microsoft.com/office/drawing/2014/main" id="{79444BC7-0BA1-C581-8838-906EF14A3079}"/>
-              </a:ext>
-            </a:extLst>
-          </p:cNvPr>
-          <p:cNvSpPr txBox="1"/>
-          <p:nvPr/>
-        </p:nvSpPr>
-        <p:spPr>
-          <a:xfrm>
-            <a:off x="4195482" y="1010565"/>
-            <a:ext cx="3791077" cy="5355312"/>
-          </a:xfrm>
-          <a:prstGeom prst="rect">
-            <a:avLst/>
-          </a:prstGeom>
-          <a:noFill/>
-        </p:spPr>
-        <p:txBody>
-          <a:bodyPr wrap="square" rtlCol="0">
-            <a:spAutoFit/>
-          </a:bodyPr>
-          <a:lstStyle/>
-          <a:p>
-            <a:r>
-              <a:rPr lang="en-US" dirty="0"/>
-              <a:t>Female Mean Blood Glucose </a:t>
-            </a:r>
-          </a:p>
-          <a:p>
-            <a:r>
-              <a:rPr lang="en-US" dirty="0"/>
-              <a:t>Diabetics:  194</a:t>
-            </a:r>
-          </a:p>
-          <a:p>
-            <a:r>
-              <a:rPr lang="en-US" dirty="0"/>
-              <a:t>Female Mean Blood Glucose Non-Diabetics:  132</a:t>
-            </a:r>
-          </a:p>
-          <a:p>
-            <a:r>
-              <a:rPr lang="en-US" dirty="0" err="1"/>
-              <a:t>Ttest</a:t>
-            </a:r>
-            <a:r>
-              <a:rPr lang="en-US" dirty="0"/>
-              <a:t> value:  67.03   p-value  0.00</a:t>
-            </a:r>
-          </a:p>
-          <a:p>
-            <a:endParaRPr lang="en-US" dirty="0"/>
-          </a:p>
-          <a:p>
-            <a:r>
-              <a:rPr lang="en-US" dirty="0"/>
-              <a:t>Male Mean Blood Glucose </a:t>
-            </a:r>
-          </a:p>
-          <a:p>
-            <a:r>
-              <a:rPr lang="en-US" dirty="0"/>
-              <a:t>Diabetics:  194.38</a:t>
-            </a:r>
-          </a:p>
-          <a:p>
-            <a:r>
-              <a:rPr lang="en-US" dirty="0"/>
-              <a:t>Male Mean Blood Glucose Non-Diabetics:  132.92</a:t>
-            </a:r>
-          </a:p>
-          <a:p>
-            <a:r>
-              <a:rPr lang="en-US" dirty="0" err="1"/>
-              <a:t>Ttest</a:t>
-            </a:r>
-            <a:r>
-              <a:rPr lang="en-US" dirty="0"/>
-              <a:t> value:   64.03    p-value  0.00</a:t>
-            </a:r>
-          </a:p>
-          <a:p>
-            <a:endParaRPr lang="en-US" dirty="0"/>
-          </a:p>
-          <a:p>
-            <a:r>
-              <a:rPr lang="en-US" dirty="0"/>
-              <a:t>This shows there is practically no difference between the male and female diabetics and non-diabetics with regard to the blood glucose level, however there is a significant difference between diabetic and non-diabetic blood glucose levels.</a:t>
-            </a:r>
-          </a:p>
-        </p:txBody>
-      </p:sp>
-    </p:spTree>
-    <p:extLst>
-      <p:ext uri="{BB962C8B-B14F-4D97-AF65-F5344CB8AC3E}">
-        <p14:creationId xmlns:p14="http://schemas.microsoft.com/office/powerpoint/2010/main" val="1436951672"/>
-      </p:ext>
-    </p:extLst>
-  </p:cSld>
-  <p:clrMapOvr>
-    <a:masterClrMapping/>
-  </p:clrMapOvr>
-  <mc:AlternateContent xmlns:mc="http://schemas.openxmlformats.org/markup-compatibility/2006" xmlns:p14="http://schemas.microsoft.com/office/powerpoint/2010/main">
-    <mc:Choice Requires="p14">
-      <p:transition spd="slow" p14:dur="2000">
-        <p14:warp dir="in"/>
-      </p:transition>
-    </mc:Choice>
-    <mc:Fallback xmlns="">
-      <p:transition spd="slow">
-        <p:fade/>
-      </p:transition>
-    </mc:Fallback>
-  </mc:AlternateContent>
-</p:sld>
-</file>
-
-<file path=ppt/slides/slide12.xml><?xml version="1.0" encoding="utf-8"?>
-<p:sld xmlns:a="http://schemas.openxmlformats.org/drawingml/2006/main" xmlns:r="http://schemas.openxmlformats.org/officeDocument/2006/relationships" xmlns:p="http://schemas.openxmlformats.org/presentationml/2006/main">
-  <p:cSld>
-    <p:spTree>
-      <p:nvGrpSpPr>
-        <p:cNvPr id="1" name=""/>
-        <p:cNvGrpSpPr/>
-        <p:nvPr/>
-      </p:nvGrpSpPr>
-      <p:grpSpPr>
-        <a:xfrm>
-          <a:off x="0" y="0"/>
-          <a:ext cx="0" cy="0"/>
-          <a:chOff x="0" y="0"/>
-          <a:chExt cx="0" cy="0"/>
-        </a:xfrm>
-      </p:grpSpPr>
-      <p:sp>
-        <p:nvSpPr>
-          <p:cNvPr id="2" name="Title 1">
-            <a:extLst>
-              <a:ext uri="{FF2B5EF4-FFF2-40B4-BE49-F238E27FC236}">
-                <a16:creationId xmlns:a16="http://schemas.microsoft.com/office/drawing/2014/main" id="{FCB102D8-1D22-4940-AF19-07CF3A0DC5F4}"/>
-              </a:ext>
-            </a:extLst>
-          </p:cNvPr>
-          <p:cNvSpPr>
-            <a:spLocks noGrp="1"/>
-          </p:cNvSpPr>
-          <p:nvPr>
-            <p:ph type="title"/>
-          </p:nvPr>
-        </p:nvSpPr>
-        <p:spPr>
-          <a:xfrm>
-            <a:off x="550861" y="549275"/>
-            <a:ext cx="11448481" cy="770567"/>
-          </a:xfrm>
-        </p:spPr>
-        <p:txBody>
-          <a:bodyPr/>
-          <a:lstStyle/>
-          <a:p>
-            <a:pPr algn="ctr"/>
-            <a:r>
-              <a:rPr lang="en-US" sz="4000" dirty="0">
-                <a:solidFill>
-                  <a:srgbClr val="FF6600"/>
-                </a:solidFill>
-              </a:rPr>
-              <a:t>Smoking</a:t>
-            </a:r>
-            <a:r>
-              <a:rPr lang="en-US" sz="4000" dirty="0"/>
-              <a:t>: Males Vs. Female - Age </a:t>
-            </a:r>
-            <a:r>
-              <a:rPr lang="en-US" sz="4000" u="sng" dirty="0"/>
-              <a:t>&gt;</a:t>
-            </a:r>
-            <a:r>
-              <a:rPr lang="en-US" sz="4000" dirty="0"/>
-              <a:t> 30</a:t>
-            </a:r>
-          </a:p>
-        </p:txBody>
-      </p:sp>
-      <p:sp>
-        <p:nvSpPr>
-          <p:cNvPr id="14" name="Date Placeholder 13">
-            <a:extLst>
-              <a:ext uri="{FF2B5EF4-FFF2-40B4-BE49-F238E27FC236}">
-                <a16:creationId xmlns:a16="http://schemas.microsoft.com/office/drawing/2014/main" id="{DC738669-5750-45EA-9715-A0041D4C569B}"/>
-              </a:ext>
-            </a:extLst>
-          </p:cNvPr>
-          <p:cNvSpPr>
-            <a:spLocks noGrp="1"/>
-          </p:cNvSpPr>
-          <p:nvPr>
-            <p:ph type="dt" sz="half" idx="10"/>
-          </p:nvPr>
-        </p:nvSpPr>
-        <p:spPr>
-          <a:xfrm>
-            <a:off x="550863" y="6507212"/>
-            <a:ext cx="2628900" cy="153888"/>
-          </a:xfrm>
-        </p:spPr>
-        <p:txBody>
-          <a:bodyPr/>
-          <a:lstStyle/>
-          <a:p>
-            <a:r>
-              <a:rPr lang="en-US"/>
-              <a:t>Thursday, May 4th, 2023</a:t>
-            </a:r>
-          </a:p>
-        </p:txBody>
-      </p:sp>
-      <p:sp>
-        <p:nvSpPr>
-          <p:cNvPr id="15" name="Footer Placeholder 14">
-            <a:extLst>
-              <a:ext uri="{FF2B5EF4-FFF2-40B4-BE49-F238E27FC236}">
-                <a16:creationId xmlns:a16="http://schemas.microsoft.com/office/drawing/2014/main" id="{CD05A243-8080-4F6D-8538-65CDDF891BA6}"/>
-              </a:ext>
-            </a:extLst>
-          </p:cNvPr>
-          <p:cNvSpPr>
-            <a:spLocks noGrp="1"/>
-          </p:cNvSpPr>
-          <p:nvPr>
-            <p:ph type="ftr" sz="quarter" idx="11"/>
-          </p:nvPr>
-        </p:nvSpPr>
-        <p:spPr>
-          <a:xfrm>
-            <a:off x="3359150" y="6507212"/>
-            <a:ext cx="6379210" cy="153888"/>
-          </a:xfrm>
-        </p:spPr>
-        <p:txBody>
-          <a:bodyPr/>
-          <a:lstStyle/>
-          <a:p>
-            <a:pPr algn="ctr"/>
-            <a:r>
-              <a:rPr lang="en-US"/>
-              <a:t>The Underlying Causes of Diabetes</a:t>
-            </a:r>
-            <a:endParaRPr lang="en-US" dirty="0"/>
-          </a:p>
-        </p:txBody>
-      </p:sp>
-      <p:sp>
-        <p:nvSpPr>
-          <p:cNvPr id="16" name="Slide Number Placeholder 15">
-            <a:extLst>
-              <a:ext uri="{FF2B5EF4-FFF2-40B4-BE49-F238E27FC236}">
-                <a16:creationId xmlns:a16="http://schemas.microsoft.com/office/drawing/2014/main" id="{3F8A62C8-5437-4C47-AC0F-0605F84CBA57}"/>
-              </a:ext>
-            </a:extLst>
-          </p:cNvPr>
-          <p:cNvSpPr>
-            <a:spLocks noGrp="1"/>
-          </p:cNvSpPr>
-          <p:nvPr>
-            <p:ph type="sldNum" sz="quarter" idx="12"/>
-          </p:nvPr>
-        </p:nvSpPr>
-        <p:spPr>
-          <a:xfrm>
-            <a:off x="9948863" y="6507212"/>
-            <a:ext cx="1692274" cy="153888"/>
-          </a:xfrm>
-        </p:spPr>
-        <p:txBody>
-          <a:bodyPr/>
-          <a:lstStyle/>
-          <a:p>
-            <a:fld id="{DBA1B0FB-D917-4C8C-928F-313BD683BF39}" type="slidenum">
-              <a:rPr lang="en-US" smtClean="0"/>
-              <a:pPr/>
-              <a:t>12</a:t>
-            </a:fld>
-            <a:endParaRPr lang="en-US"/>
           </a:p>
         </p:txBody>
       </p:sp>
@@ -14953,7 +14295,7 @@
 </p:sld>
 </file>
 
-<file path=ppt/slides/slide13.xml><?xml version="1.0" encoding="utf-8"?>
+<file path=ppt/slides/slide11.xml><?xml version="1.0" encoding="utf-8"?>
 <p:sld xmlns:a="http://schemas.openxmlformats.org/drawingml/2006/main" xmlns:r="http://schemas.openxmlformats.org/officeDocument/2006/relationships" xmlns:p="http://schemas.openxmlformats.org/presentationml/2006/main">
   <p:cSld>
     <p:spTree>
@@ -15006,22 +14348,14 @@
             </a:br>
             <a:r>
               <a:rPr lang="en-US" sz="3200" dirty="0"/>
-              <a:t>Diabetes effects males and females at about the same rate when looking at</a:t>
-            </a:r>
-            <a:r>
-              <a:rPr lang="en-US" sz="3200"/>
-              <a:t>:  </a:t>
+              <a:t>Diabetes effects males and females at about the same rate when looking at:  </a:t>
             </a:r>
             <a:br>
-              <a:rPr lang="en-US" sz="3200"/>
+              <a:rPr lang="en-US" sz="3200" dirty="0"/>
             </a:br>
             <a:r>
-              <a:rPr lang="en-US" sz="3200"/>
-              <a:t>BMI</a:t>
-            </a:r>
-            <a:r>
               <a:rPr lang="en-US" sz="3200" dirty="0"/>
-              <a:t>, AIC, blood glucose and smoking.</a:t>
+              <a:t>BMI, AIC, HTN, blood glucose, and smoking.</a:t>
             </a:r>
           </a:p>
         </p:txBody>
@@ -15087,10 +14421,9 @@
           <a:lstStyle/>
           <a:p>
             <a:r>
-              <a:rPr lang="en-US"/>
+              <a:rPr lang="en-US" dirty="0"/>
               <a:t>Thursday, May 4th, 2023</a:t>
             </a:r>
-            <a:endParaRPr lang="en-US" dirty="0"/>
           </a:p>
         </p:txBody>
       </p:sp>
@@ -15122,10 +14455,9 @@
           <a:p>
             <a:pPr algn="ctr"/>
             <a:r>
-              <a:rPr lang="en-US"/>
+              <a:rPr lang="en-US" dirty="0"/>
               <a:t>The Underlying Causes of Diabetes</a:t>
             </a:r>
-            <a:endParaRPr lang="en-US" dirty="0"/>
           </a:p>
         </p:txBody>
       </p:sp>
@@ -15158,9 +14490,9 @@
             <a:fld id="{DBA1B0FB-D917-4C8C-928F-313BD683BF39}" type="slidenum">
               <a:rPr lang="en-US" smtClean="0"/>
               <a:pPr/>
-              <a:t>13</a:t>
+              <a:t>11</a:t>
             </a:fld>
-            <a:endParaRPr lang="en-US"/>
+            <a:endParaRPr lang="en-US" dirty="0"/>
           </a:p>
         </p:txBody>
       </p:sp>
@@ -15189,7 +14521,7 @@
 </p:sld>
 </file>
 
-<file path=ppt/slides/slide14.xml><?xml version="1.0" encoding="utf-8"?>
+<file path=ppt/slides/slide12.xml><?xml version="1.0" encoding="utf-8"?>
 <p:sld xmlns:a="http://schemas.openxmlformats.org/drawingml/2006/main" xmlns:r="http://schemas.openxmlformats.org/officeDocument/2006/relationships" xmlns:p="http://schemas.openxmlformats.org/presentationml/2006/main">
   <p:cSld>
     <p:spTree>
@@ -15301,10 +14633,9 @@
           <a:lstStyle/>
           <a:p>
             <a:r>
-              <a:rPr lang="en-US"/>
+              <a:rPr lang="en-US" dirty="0"/>
               <a:t>Thursday, May 4th, 2023</a:t>
             </a:r>
-            <a:endParaRPr lang="en-US" dirty="0"/>
           </a:p>
         </p:txBody>
       </p:sp>
@@ -15336,10 +14667,9 @@
           <a:p>
             <a:pPr algn="ctr"/>
             <a:r>
-              <a:rPr lang="en-US"/>
+              <a:rPr lang="en-US" dirty="0"/>
               <a:t>The Underlying Causes of Diabetes</a:t>
             </a:r>
-            <a:endParaRPr lang="en-US" dirty="0"/>
           </a:p>
         </p:txBody>
       </p:sp>
@@ -15372,9 +14702,9 @@
             <a:fld id="{DBA1B0FB-D917-4C8C-928F-313BD683BF39}" type="slidenum">
               <a:rPr lang="en-US" smtClean="0"/>
               <a:pPr/>
-              <a:t>14</a:t>
+              <a:t>12</a:t>
             </a:fld>
-            <a:endParaRPr lang="en-US"/>
+            <a:endParaRPr lang="en-US" dirty="0"/>
           </a:p>
         </p:txBody>
       </p:sp>
@@ -15471,7 +14801,7 @@
 </p:sld>
 </file>
 
-<file path=ppt/slides/slide15.xml><?xml version="1.0" encoding="utf-8"?>
+<file path=ppt/slides/slide13.xml><?xml version="1.0" encoding="utf-8"?>
 <p:sld xmlns:a="http://schemas.openxmlformats.org/drawingml/2006/main" xmlns:r="http://schemas.openxmlformats.org/officeDocument/2006/relationships" xmlns:p="http://schemas.openxmlformats.org/presentationml/2006/main">
   <p:cSld>
     <p:spTree>
@@ -15583,10 +14913,9 @@
           <a:lstStyle/>
           <a:p>
             <a:r>
-              <a:rPr lang="en-US"/>
+              <a:rPr lang="en-US" dirty="0"/>
               <a:t>Thursday, May 4th, 2023</a:t>
             </a:r>
-            <a:endParaRPr lang="en-US" dirty="0"/>
           </a:p>
         </p:txBody>
       </p:sp>
@@ -15618,10 +14947,9 @@
           <a:p>
             <a:pPr algn="ctr"/>
             <a:r>
-              <a:rPr lang="en-US"/>
+              <a:rPr lang="en-US" dirty="0"/>
               <a:t>The Underlying Causes of Diabetes</a:t>
             </a:r>
-            <a:endParaRPr lang="en-US" dirty="0"/>
           </a:p>
         </p:txBody>
       </p:sp>
@@ -15654,9 +14982,9 @@
             <a:fld id="{DBA1B0FB-D917-4C8C-928F-313BD683BF39}" type="slidenum">
               <a:rPr lang="en-US" smtClean="0"/>
               <a:pPr/>
-              <a:t>15</a:t>
+              <a:t>13</a:t>
             </a:fld>
-            <a:endParaRPr lang="en-US"/>
+            <a:endParaRPr lang="en-US" dirty="0"/>
           </a:p>
         </p:txBody>
       </p:sp>
@@ -15786,324 +15114,6 @@
 </p:sld>
 </file>
 
-<file path=ppt/slides/slide16.xml><?xml version="1.0" encoding="utf-8"?>
-<p:sld xmlns:a="http://schemas.openxmlformats.org/drawingml/2006/main" xmlns:r="http://schemas.openxmlformats.org/officeDocument/2006/relationships" xmlns:p="http://schemas.openxmlformats.org/presentationml/2006/main">
-  <p:cSld>
-    <p:spTree>
-      <p:nvGrpSpPr>
-        <p:cNvPr id="1" name=""/>
-        <p:cNvGrpSpPr/>
-        <p:nvPr/>
-      </p:nvGrpSpPr>
-      <p:grpSpPr>
-        <a:xfrm>
-          <a:off x="0" y="0"/>
-          <a:ext cx="0" cy="0"/>
-          <a:chOff x="0" y="0"/>
-          <a:chExt cx="0" cy="0"/>
-        </a:xfrm>
-      </p:grpSpPr>
-      <p:sp>
-        <p:nvSpPr>
-          <p:cNvPr id="2" name="Title 1">
-            <a:extLst>
-              <a:ext uri="{FF2B5EF4-FFF2-40B4-BE49-F238E27FC236}">
-                <a16:creationId xmlns:a16="http://schemas.microsoft.com/office/drawing/2014/main" id="{FCB102D8-1D22-4940-AF19-07CF3A0DC5F4}"/>
-              </a:ext>
-            </a:extLst>
-          </p:cNvPr>
-          <p:cNvSpPr>
-            <a:spLocks noGrp="1"/>
-          </p:cNvSpPr>
-          <p:nvPr>
-            <p:ph type="title"/>
-          </p:nvPr>
-        </p:nvSpPr>
-        <p:spPr>
-          <a:xfrm>
-            <a:off x="550861" y="549275"/>
-            <a:ext cx="11448481" cy="770567"/>
-          </a:xfrm>
-        </p:spPr>
-        <p:txBody>
-          <a:bodyPr/>
-          <a:lstStyle/>
-          <a:p>
-            <a:pPr algn="ctr"/>
-            <a:r>
-              <a:rPr lang="en-US" sz="4000" dirty="0"/>
-              <a:t>Body Mass Index(</a:t>
-            </a:r>
-            <a:r>
-              <a:rPr lang="en-US" sz="4000" dirty="0">
-                <a:solidFill>
-                  <a:srgbClr val="FF6600"/>
-                </a:solidFill>
-              </a:rPr>
-              <a:t>BMI</a:t>
-            </a:r>
-            <a:r>
-              <a:rPr lang="en-US" sz="4000" dirty="0"/>
-              <a:t>): Males Vs. Female - Age </a:t>
-            </a:r>
-            <a:r>
-              <a:rPr lang="en-US" sz="4000" u="sng" dirty="0"/>
-              <a:t>&gt;</a:t>
-            </a:r>
-            <a:r>
-              <a:rPr lang="en-US" sz="4000" dirty="0"/>
-              <a:t> 30</a:t>
-            </a:r>
-          </a:p>
-        </p:txBody>
-      </p:sp>
-      <p:sp>
-        <p:nvSpPr>
-          <p:cNvPr id="14" name="Date Placeholder 13">
-            <a:extLst>
-              <a:ext uri="{FF2B5EF4-FFF2-40B4-BE49-F238E27FC236}">
-                <a16:creationId xmlns:a16="http://schemas.microsoft.com/office/drawing/2014/main" id="{DC738669-5750-45EA-9715-A0041D4C569B}"/>
-              </a:ext>
-            </a:extLst>
-          </p:cNvPr>
-          <p:cNvSpPr>
-            <a:spLocks noGrp="1"/>
-          </p:cNvSpPr>
-          <p:nvPr>
-            <p:ph type="dt" sz="half" idx="10"/>
-          </p:nvPr>
-        </p:nvSpPr>
-        <p:spPr>
-          <a:xfrm>
-            <a:off x="550863" y="6507212"/>
-            <a:ext cx="2628900" cy="153888"/>
-          </a:xfrm>
-        </p:spPr>
-        <p:txBody>
-          <a:bodyPr/>
-          <a:lstStyle/>
-          <a:p>
-            <a:r>
-              <a:rPr lang="en-US"/>
-              <a:t>Thursday, May 4th, 2023</a:t>
-            </a:r>
-          </a:p>
-        </p:txBody>
-      </p:sp>
-      <p:sp>
-        <p:nvSpPr>
-          <p:cNvPr id="15" name="Footer Placeholder 14">
-            <a:extLst>
-              <a:ext uri="{FF2B5EF4-FFF2-40B4-BE49-F238E27FC236}">
-                <a16:creationId xmlns:a16="http://schemas.microsoft.com/office/drawing/2014/main" id="{CD05A243-8080-4F6D-8538-65CDDF891BA6}"/>
-              </a:ext>
-            </a:extLst>
-          </p:cNvPr>
-          <p:cNvSpPr>
-            <a:spLocks noGrp="1"/>
-          </p:cNvSpPr>
-          <p:nvPr>
-            <p:ph type="ftr" sz="quarter" idx="11"/>
-          </p:nvPr>
-        </p:nvSpPr>
-        <p:spPr>
-          <a:xfrm>
-            <a:off x="3359150" y="6507212"/>
-            <a:ext cx="6379210" cy="153888"/>
-          </a:xfrm>
-        </p:spPr>
-        <p:txBody>
-          <a:bodyPr/>
-          <a:lstStyle/>
-          <a:p>
-            <a:pPr algn="ctr"/>
-            <a:r>
-              <a:rPr lang="en-US"/>
-              <a:t>The Underlying Causes of Diabetes</a:t>
-            </a:r>
-            <a:endParaRPr lang="en-US" dirty="0"/>
-          </a:p>
-        </p:txBody>
-      </p:sp>
-      <p:sp>
-        <p:nvSpPr>
-          <p:cNvPr id="16" name="Slide Number Placeholder 15">
-            <a:extLst>
-              <a:ext uri="{FF2B5EF4-FFF2-40B4-BE49-F238E27FC236}">
-                <a16:creationId xmlns:a16="http://schemas.microsoft.com/office/drawing/2014/main" id="{3F8A62C8-5437-4C47-AC0F-0605F84CBA57}"/>
-              </a:ext>
-            </a:extLst>
-          </p:cNvPr>
-          <p:cNvSpPr>
-            <a:spLocks noGrp="1"/>
-          </p:cNvSpPr>
-          <p:nvPr>
-            <p:ph type="sldNum" sz="quarter" idx="12"/>
-          </p:nvPr>
-        </p:nvSpPr>
-        <p:spPr>
-          <a:xfrm>
-            <a:off x="9948863" y="6507212"/>
-            <a:ext cx="1692274" cy="153888"/>
-          </a:xfrm>
-        </p:spPr>
-        <p:txBody>
-          <a:bodyPr/>
-          <a:lstStyle/>
-          <a:p>
-            <a:fld id="{DBA1B0FB-D917-4C8C-928F-313BD683BF39}" type="slidenum">
-              <a:rPr lang="en-US" smtClean="0"/>
-              <a:pPr/>
-              <a:t>16</a:t>
-            </a:fld>
-            <a:endParaRPr lang="en-US"/>
-          </a:p>
-        </p:txBody>
-      </p:sp>
-      <p:pic>
-        <p:nvPicPr>
-          <p:cNvPr id="5" name="Content Placeholder 4">
-            <a:extLst>
-              <a:ext uri="{FF2B5EF4-FFF2-40B4-BE49-F238E27FC236}">
-                <a16:creationId xmlns:a16="http://schemas.microsoft.com/office/drawing/2014/main" id="{5616B695-258F-B341-7B03-F05773EBB264}"/>
-              </a:ext>
-            </a:extLst>
-          </p:cNvPr>
-          <p:cNvPicPr>
-            <a:picLocks noGrp="1" noChangeAspect="1"/>
-          </p:cNvPicPr>
-          <p:nvPr>
-            <p:ph idx="1"/>
-          </p:nvPr>
-        </p:nvPicPr>
-        <p:blipFill>
-          <a:blip r:embed="rId2"/>
-          <a:stretch>
-            <a:fillRect/>
-          </a:stretch>
-        </p:blipFill>
-        <p:spPr>
-          <a:xfrm>
-            <a:off x="192658" y="1097324"/>
-            <a:ext cx="3751269" cy="2872923"/>
-          </a:xfrm>
-        </p:spPr>
-      </p:pic>
-      <p:pic>
-        <p:nvPicPr>
-          <p:cNvPr id="7" name="Picture 6">
-            <a:extLst>
-              <a:ext uri="{FF2B5EF4-FFF2-40B4-BE49-F238E27FC236}">
-                <a16:creationId xmlns:a16="http://schemas.microsoft.com/office/drawing/2014/main" id="{DBEB066F-EED7-1ABF-6E52-471D288CE9F0}"/>
-              </a:ext>
-            </a:extLst>
-          </p:cNvPr>
-          <p:cNvPicPr>
-            <a:picLocks noChangeAspect="1"/>
-          </p:cNvPicPr>
-          <p:nvPr/>
-        </p:nvPicPr>
-        <p:blipFill>
-          <a:blip r:embed="rId3"/>
-          <a:stretch>
-            <a:fillRect/>
-          </a:stretch>
-        </p:blipFill>
-        <p:spPr>
-          <a:xfrm>
-            <a:off x="7918662" y="1119091"/>
-            <a:ext cx="3722475" cy="2782581"/>
-          </a:xfrm>
-          <a:prstGeom prst="rect">
-            <a:avLst/>
-          </a:prstGeom>
-        </p:spPr>
-      </p:pic>
-      <p:pic>
-        <p:nvPicPr>
-          <p:cNvPr id="9" name="Picture 8">
-            <a:extLst>
-              <a:ext uri="{FF2B5EF4-FFF2-40B4-BE49-F238E27FC236}">
-                <a16:creationId xmlns:a16="http://schemas.microsoft.com/office/drawing/2014/main" id="{84B09171-1951-794B-3413-2A57C6772D2F}"/>
-              </a:ext>
-            </a:extLst>
-          </p:cNvPr>
-          <p:cNvPicPr>
-            <a:picLocks noChangeAspect="1"/>
-          </p:cNvPicPr>
-          <p:nvPr/>
-        </p:nvPicPr>
-        <p:blipFill>
-          <a:blip r:embed="rId4"/>
-          <a:stretch>
-            <a:fillRect/>
-          </a:stretch>
-        </p:blipFill>
-        <p:spPr>
-          <a:xfrm>
-            <a:off x="7918661" y="3970247"/>
-            <a:ext cx="3722475" cy="2818180"/>
-          </a:xfrm>
-          <a:prstGeom prst="rect">
-            <a:avLst/>
-          </a:prstGeom>
-        </p:spPr>
-      </p:pic>
-      <p:pic>
-        <p:nvPicPr>
-          <p:cNvPr id="11" name="Picture 10">
-            <a:extLst>
-              <a:ext uri="{FF2B5EF4-FFF2-40B4-BE49-F238E27FC236}">
-                <a16:creationId xmlns:a16="http://schemas.microsoft.com/office/drawing/2014/main" id="{2EDF9352-F397-A23B-416D-4A4B6563D723}"/>
-              </a:ext>
-            </a:extLst>
-          </p:cNvPr>
-          <p:cNvPicPr>
-            <a:picLocks noChangeAspect="1"/>
-          </p:cNvPicPr>
-          <p:nvPr/>
-        </p:nvPicPr>
-        <p:blipFill>
-          <a:blip r:embed="rId5"/>
-          <a:stretch>
-            <a:fillRect/>
-          </a:stretch>
-        </p:blipFill>
-        <p:spPr>
-          <a:xfrm>
-            <a:off x="192658" y="3992927"/>
-            <a:ext cx="3751269" cy="2818180"/>
-          </a:xfrm>
-          <a:prstGeom prst="rect">
-            <a:avLst/>
-          </a:prstGeom>
-        </p:spPr>
-      </p:pic>
-    </p:spTree>
-    <p:extLst>
-      <p:ext uri="{BB962C8B-B14F-4D97-AF65-F5344CB8AC3E}">
-        <p14:creationId xmlns:p14="http://schemas.microsoft.com/office/powerpoint/2010/main" val="523071793"/>
-      </p:ext>
-    </p:extLst>
-  </p:cSld>
-  <p:clrMapOvr>
-    <a:masterClrMapping/>
-  </p:clrMapOvr>
-  <mc:AlternateContent xmlns:mc="http://schemas.openxmlformats.org/markup-compatibility/2006" xmlns:p14="http://schemas.microsoft.com/office/powerpoint/2010/main">
-    <mc:Choice Requires="p14">
-      <p:transition spd="slow" p14:dur="2000">
-        <p:dissolve/>
-      </p:transition>
-    </mc:Choice>
-    <mc:Fallback xmlns="">
-      <p:transition spd="slow">
-        <p:dissolve/>
-      </p:transition>
-    </mc:Fallback>
-  </mc:AlternateContent>
-</p:sld>
-</file>
-
 <file path=ppt/slides/slide2.xml><?xml version="1.0" encoding="utf-8"?>
 <p:sld xmlns:a="http://schemas.openxmlformats.org/drawingml/2006/main" xmlns:r="http://schemas.openxmlformats.org/officeDocument/2006/relationships" xmlns:p="http://schemas.openxmlformats.org/presentationml/2006/main">
   <p:cSld>
@@ -16184,7 +15194,7 @@
         <p:spPr>
           <a:xfrm>
             <a:off x="462296" y="1704721"/>
-            <a:ext cx="6119659" cy="3557392"/>
+            <a:ext cx="6659466" cy="4126736"/>
           </a:xfrm>
         </p:spPr>
         <p:txBody>
@@ -16463,6 +15473,48 @@
             </a:endParaRPr>
           </a:p>
           <a:p>
+            <a:pPr marL="342900" indent="-342900" rtl="0">
+              <a:spcBef>
+                <a:spcPts val="0"/>
+              </a:spcBef>
+              <a:spcAft>
+                <a:spcPts val="0"/>
+              </a:spcAft>
+              <a:buFont typeface="Arial" panose="020B0604020202020204" pitchFamily="34" charset="0"/>
+              <a:buChar char="•"/>
+            </a:pPr>
+            <a:r>
+              <a:rPr lang="en-US" b="0" i="0" u="none" strike="noStrike" dirty="0">
+                <a:solidFill>
+                  <a:schemeClr val="tx1"/>
+                </a:solidFill>
+                <a:effectLst/>
+                <a:latin typeface="Times New Roman" panose="02020603050405020304" pitchFamily="18" charset="0"/>
+                <a:cs typeface="Times New Roman" panose="02020603050405020304" pitchFamily="18" charset="0"/>
+              </a:rPr>
+              <a:t>What is the average blood glucose levels of most diabetics?</a:t>
+            </a:r>
+          </a:p>
+          <a:p>
+            <a:pPr marL="342900" indent="-342900" rtl="0">
+              <a:spcBef>
+                <a:spcPts val="0"/>
+              </a:spcBef>
+              <a:spcAft>
+                <a:spcPts val="0"/>
+              </a:spcAft>
+              <a:buFont typeface="Arial" panose="020B0604020202020204" pitchFamily="34" charset="0"/>
+              <a:buChar char="•"/>
+            </a:pPr>
+            <a:endParaRPr lang="en-US" dirty="0">
+              <a:solidFill>
+                <a:schemeClr val="tx1"/>
+              </a:solidFill>
+              <a:latin typeface="Times New Roman" panose="02020603050405020304" pitchFamily="18" charset="0"/>
+              <a:cs typeface="Times New Roman" panose="02020603050405020304" pitchFamily="18" charset="0"/>
+            </a:endParaRPr>
+          </a:p>
+          <a:p>
             <a:pPr marL="0" indent="0" rtl="0">
               <a:spcBef>
                 <a:spcPts val="0"/>
@@ -16620,7 +15672,7 @@
           <a:lstStyle/>
           <a:p>
             <a:r>
-              <a:rPr lang="en-US"/>
+              <a:rPr lang="en-US" dirty="0"/>
               <a:t>Thursday, May 4th, 2023</a:t>
             </a:r>
           </a:p>
@@ -16654,10 +15706,9 @@
           <a:p>
             <a:pPr algn="ctr"/>
             <a:r>
-              <a:rPr lang="en-US"/>
+              <a:rPr lang="en-US" dirty="0"/>
               <a:t>The Underlying Causes of Diabetes</a:t>
             </a:r>
-            <a:endParaRPr lang="en-US" dirty="0"/>
           </a:p>
         </p:txBody>
       </p:sp>
@@ -16692,7 +15743,7 @@
               <a:pPr/>
               <a:t>2</a:t>
             </a:fld>
-            <a:endParaRPr lang="en-US"/>
+            <a:endParaRPr lang="en-US" dirty="0"/>
           </a:p>
         </p:txBody>
       </p:sp>
@@ -16945,7 +15996,7 @@
                 <a:latin typeface="Times New Roman" panose="02020603050405020304" pitchFamily="18" charset="0"/>
                 <a:cs typeface="Times New Roman" panose="02020603050405020304" pitchFamily="18" charset="0"/>
               </a:rPr>
-              <a:t>The data was analyzed for missing and non-values. Then filtered for ages greater than </a:t>
+              <a:t>Data cleaning:  the data was analyzed for missing and non-values. Then filtered for ages greater than </a:t>
             </a:r>
             <a:r>
               <a:rPr lang="en-US" sz="1800" dirty="0">
@@ -16965,7 +16016,27 @@
                 <a:latin typeface="Times New Roman" panose="02020603050405020304" pitchFamily="18" charset="0"/>
                 <a:cs typeface="Times New Roman" panose="02020603050405020304" pitchFamily="18" charset="0"/>
               </a:rPr>
-              <a:t>. (Thirty is considered the cut off for Type 2 diabetes.) The data was further filtered for diabetics, non-diabetics, and gender.</a:t>
+              <a:t>. (Thirty is considered the cut off for </a:t>
+            </a:r>
+            <a:r>
+              <a:rPr lang="en-US" sz="1800" dirty="0">
+                <a:solidFill>
+                  <a:srgbClr val="FF6600"/>
+                </a:solidFill>
+                <a:latin typeface="Times New Roman" panose="02020603050405020304" pitchFamily="18" charset="0"/>
+                <a:cs typeface="Times New Roman" panose="02020603050405020304" pitchFamily="18" charset="0"/>
+              </a:rPr>
+              <a:t>Type 2</a:t>
+            </a:r>
+            <a:r>
+              <a:rPr lang="en-US" sz="1800" dirty="0">
+                <a:solidFill>
+                  <a:schemeClr val="tx1"/>
+                </a:solidFill>
+                <a:latin typeface="Times New Roman" panose="02020603050405020304" pitchFamily="18" charset="0"/>
+                <a:cs typeface="Times New Roman" panose="02020603050405020304" pitchFamily="18" charset="0"/>
+              </a:rPr>
+              <a:t> diabetes.) The data was further filtered for diabetics, non-diabetics, and gender.</a:t>
             </a:r>
           </a:p>
         </p:txBody>
@@ -16992,10 +16063,9 @@
           <a:lstStyle/>
           <a:p>
             <a:r>
-              <a:rPr lang="en-US"/>
+              <a:rPr lang="en-US" dirty="0"/>
               <a:t>Thursday, May 4th, 2023</a:t>
             </a:r>
-            <a:endParaRPr lang="en-US" dirty="0"/>
           </a:p>
         </p:txBody>
       </p:sp>
@@ -17054,7 +16124,7 @@
               <a:pPr/>
               <a:t>3</a:t>
             </a:fld>
-            <a:endParaRPr lang="en-US"/>
+            <a:endParaRPr lang="en-US" dirty="0"/>
           </a:p>
         </p:txBody>
       </p:sp>
@@ -17228,10 +16298,9 @@
           <a:lstStyle/>
           <a:p>
             <a:r>
-              <a:rPr lang="en-US"/>
+              <a:rPr lang="en-US" dirty="0"/>
               <a:t>Thursday, May 4th, 2023</a:t>
             </a:r>
-            <a:endParaRPr lang="en-US" dirty="0"/>
           </a:p>
         </p:txBody>
       </p:sp>
@@ -17258,10 +16327,9 @@
           <a:p>
             <a:pPr algn="ctr"/>
             <a:r>
-              <a:rPr lang="en-US"/>
+              <a:rPr lang="en-US" dirty="0"/>
               <a:t>The Underlying Causes of Diabetes</a:t>
             </a:r>
-            <a:endParaRPr lang="en-US" dirty="0"/>
           </a:p>
         </p:txBody>
       </p:sp>
@@ -17291,7 +16359,7 @@
               <a:pPr/>
               <a:t>4</a:t>
             </a:fld>
-            <a:endParaRPr lang="en-US"/>
+            <a:endParaRPr lang="en-US" dirty="0"/>
           </a:p>
         </p:txBody>
       </p:sp>
@@ -17386,8 +16454,8 @@
         </p:nvSpPr>
         <p:spPr>
           <a:xfrm>
-            <a:off x="4146066" y="1165265"/>
-            <a:ext cx="7345362" cy="5143460"/>
+            <a:off x="4146065" y="1165265"/>
+            <a:ext cx="7373489" cy="5143460"/>
           </a:xfrm>
           <a:prstGeom prst="rect">
             <a:avLst/>
@@ -17590,13 +16658,55 @@
           <a:p>
             <a:r>
               <a:rPr lang="en-US" dirty="0"/>
-              <a:t>Diabetes (type 2) occurs in approximately 10% of the US population</a:t>
-            </a:r>
-          </a:p>
-          <a:p>
+              <a:t>Diabetes (type 2) occurs in approximately </a:t>
+            </a:r>
+            <a:r>
+              <a:rPr lang="en-US" dirty="0">
+                <a:solidFill>
+                  <a:srgbClr val="FF6600">
+                    <a:alpha val="60000"/>
+                  </a:srgbClr>
+                </a:solidFill>
+              </a:rPr>
+              <a:t>10%</a:t>
+            </a:r>
             <a:r>
               <a:rPr lang="en-US" dirty="0"/>
-              <a:t>In 2020 that was estimated to be approximately 34.2 million people, only ¼ were 	diagnosed</a:t>
+              <a:t> of the US population</a:t>
+            </a:r>
+          </a:p>
+          <a:p>
+            <a:r>
+              <a:rPr lang="en-US" dirty="0"/>
+              <a:t>In 2020 that was estimated to be approximately </a:t>
+            </a:r>
+            <a:r>
+              <a:rPr lang="en-US" dirty="0">
+                <a:solidFill>
+                  <a:srgbClr val="FF6600">
+                    <a:alpha val="60000"/>
+                  </a:srgbClr>
+                </a:solidFill>
+              </a:rPr>
+              <a:t>34.2 million </a:t>
+            </a:r>
+            <a:r>
+              <a:rPr lang="en-US" dirty="0"/>
+              <a:t>people, only </a:t>
+            </a:r>
+            <a:r>
+              <a:rPr lang="en-US" dirty="0">
+                <a:solidFill>
+                  <a:srgbClr val="FF6600">
+                    <a:alpha val="60000"/>
+                  </a:srgbClr>
+                </a:solidFill>
+              </a:rPr>
+              <a:t>¼</a:t>
+            </a:r>
+            <a:r>
+              <a:rPr lang="en-US" dirty="0"/>
+              <a:t> were 	diagnosed</a:t>
             </a:r>
           </a:p>
           <a:p>
@@ -17930,7 +17040,7 @@
           <a:lstStyle/>
           <a:p>
             <a:r>
-              <a:rPr lang="en-US"/>
+              <a:rPr lang="en-US" dirty="0"/>
               <a:t>Thursday, May 4th, 2023</a:t>
             </a:r>
           </a:p>
@@ -17964,10 +17074,9 @@
           <a:p>
             <a:pPr algn="ctr"/>
             <a:r>
-              <a:rPr lang="en-US"/>
+              <a:rPr lang="en-US" dirty="0"/>
               <a:t>The Underlying Causes of Diabetes</a:t>
             </a:r>
-            <a:endParaRPr lang="en-US" dirty="0"/>
           </a:p>
         </p:txBody>
       </p:sp>
@@ -18002,7 +17111,7 @@
               <a:pPr/>
               <a:t>5</a:t>
             </a:fld>
-            <a:endParaRPr lang="en-US"/>
+            <a:endParaRPr lang="en-US" dirty="0"/>
           </a:p>
         </p:txBody>
       </p:sp>
@@ -18226,7 +17335,7 @@
           <a:lstStyle/>
           <a:p>
             <a:r>
-              <a:rPr lang="en-US"/>
+              <a:rPr lang="en-US" dirty="0"/>
               <a:t>Thursday, May 4th, 2023</a:t>
             </a:r>
           </a:p>
@@ -18260,10 +17369,9 @@
           <a:p>
             <a:pPr algn="ctr"/>
             <a:r>
-              <a:rPr lang="en-US"/>
+              <a:rPr lang="en-US" dirty="0"/>
               <a:t>The Underlying Causes of Diabetes</a:t>
             </a:r>
-            <a:endParaRPr lang="en-US" dirty="0"/>
           </a:p>
         </p:txBody>
       </p:sp>
@@ -18298,7 +17406,7 @@
               <a:pPr/>
               <a:t>6</a:t>
             </a:fld>
-            <a:endParaRPr lang="en-US"/>
+            <a:endParaRPr lang="en-US" dirty="0"/>
           </a:p>
         </p:txBody>
       </p:sp>
@@ -18542,8 +17650,8 @@
         </p:nvSpPr>
         <p:spPr>
           <a:xfrm>
-            <a:off x="165340" y="497517"/>
-            <a:ext cx="11861319" cy="623917"/>
+            <a:off x="550861" y="549275"/>
+            <a:ext cx="11448481" cy="770567"/>
           </a:xfrm>
         </p:spPr>
         <p:txBody>
@@ -18552,15 +17660,27 @@
           <a:p>
             <a:pPr algn="ctr"/>
             <a:r>
-              <a:rPr lang="en-US" sz="3900" dirty="0"/>
-              <a:t>Non-Diabetic: Males Vs. Female -Age </a:t>
-            </a:r>
-            <a:r>
-              <a:rPr lang="en-US" sz="3900" u="sng" dirty="0"/>
+              <a:rPr lang="en-US" sz="4000" dirty="0"/>
+              <a:t>Hypertension(</a:t>
+            </a:r>
+            <a:r>
+              <a:rPr lang="en-US" sz="4000" dirty="0">
+                <a:solidFill>
+                  <a:srgbClr val="FF6600"/>
+                </a:solidFill>
+              </a:rPr>
+              <a:t>HTN</a:t>
+            </a:r>
+            <a:r>
+              <a:rPr lang="en-US" sz="4000" dirty="0"/>
+              <a:t>): Males Vs. Female - Age </a:t>
+            </a:r>
+            <a:r>
+              <a:rPr lang="en-US" sz="4000" u="sng" dirty="0"/>
               <a:t>&gt;</a:t>
             </a:r>
             <a:r>
-              <a:rPr lang="en-US" sz="3900" dirty="0"/>
+              <a:rPr lang="en-US" sz="4000" dirty="0"/>
               <a:t> 30</a:t>
             </a:r>
           </a:p>
@@ -18593,7 +17713,7 @@
           <a:lstStyle/>
           <a:p>
             <a:r>
-              <a:rPr lang="en-US"/>
+              <a:rPr lang="en-US" dirty="0"/>
               <a:t>Thursday, May 4th, 2023</a:t>
             </a:r>
           </a:p>
@@ -18627,10 +17747,9 @@
           <a:p>
             <a:pPr algn="ctr"/>
             <a:r>
-              <a:rPr lang="en-US"/>
+              <a:rPr lang="en-US" dirty="0"/>
               <a:t>The Underlying Causes of Diabetes</a:t>
             </a:r>
-            <a:endParaRPr lang="en-US" dirty="0"/>
           </a:p>
         </p:txBody>
       </p:sp>
@@ -18665,16 +17784,16 @@
               <a:pPr/>
               <a:t>7</a:t>
             </a:fld>
-            <a:endParaRPr lang="en-US"/>
+            <a:endParaRPr lang="en-US" dirty="0"/>
           </a:p>
         </p:txBody>
       </p:sp>
       <p:pic>
         <p:nvPicPr>
-          <p:cNvPr id="5" name="Content Placeholder 4">
-            <a:extLst>
-              <a:ext uri="{FF2B5EF4-FFF2-40B4-BE49-F238E27FC236}">
-                <a16:creationId xmlns:a16="http://schemas.microsoft.com/office/drawing/2014/main" id="{B3FB65F1-C88A-ABA7-DB34-FAA72100AD82}"/>
+          <p:cNvPr id="4" name="Content Placeholder 3">
+            <a:extLst>
+              <a:ext uri="{FF2B5EF4-FFF2-40B4-BE49-F238E27FC236}">
+                <a16:creationId xmlns:a16="http://schemas.microsoft.com/office/drawing/2014/main" id="{704CB478-6D26-76BC-134F-CD1D3CAA5BCD}"/>
               </a:ext>
             </a:extLst>
           </p:cNvPr>
@@ -18693,17 +17812,17 @@
         </p:blipFill>
         <p:spPr>
           <a:xfrm>
-            <a:off x="165340" y="1424713"/>
-            <a:ext cx="5837864" cy="4160838"/>
+            <a:off x="109250" y="1110416"/>
+            <a:ext cx="3159213" cy="2804977"/>
           </a:xfrm>
         </p:spPr>
       </p:pic>
       <p:pic>
         <p:nvPicPr>
-          <p:cNvPr id="7" name="Picture 6">
-            <a:extLst>
-              <a:ext uri="{FF2B5EF4-FFF2-40B4-BE49-F238E27FC236}">
-                <a16:creationId xmlns:a16="http://schemas.microsoft.com/office/drawing/2014/main" id="{5142CB9C-BBFE-89FB-3E63-6FE1E4387DC7}"/>
+          <p:cNvPr id="6" name="Picture 5">
+            <a:extLst>
+              <a:ext uri="{FF2B5EF4-FFF2-40B4-BE49-F238E27FC236}">
+                <a16:creationId xmlns:a16="http://schemas.microsoft.com/office/drawing/2014/main" id="{0D9794A7-08C1-F734-5D1E-DED12EAD06E0}"/>
               </a:ext>
             </a:extLst>
           </p:cNvPr>
@@ -18720,8 +17839,114 @@
         </p:blipFill>
         <p:spPr>
           <a:xfrm>
-            <a:off x="6105236" y="1424713"/>
-            <a:ext cx="5921423" cy="4166927"/>
+            <a:off x="8847599" y="1110416"/>
+            <a:ext cx="3032216" cy="2804977"/>
+          </a:xfrm>
+          <a:prstGeom prst="rect">
+            <a:avLst/>
+          </a:prstGeom>
+        </p:spPr>
+      </p:pic>
+      <p:sp>
+        <p:nvSpPr>
+          <p:cNvPr id="8" name="TextBox 7">
+            <a:extLst>
+              <a:ext uri="{FF2B5EF4-FFF2-40B4-BE49-F238E27FC236}">
+                <a16:creationId xmlns:a16="http://schemas.microsoft.com/office/drawing/2014/main" id="{62D5BFB5-3AF1-FE73-E442-41251A4C9C79}"/>
+              </a:ext>
+            </a:extLst>
+          </p:cNvPr>
+          <p:cNvSpPr txBox="1"/>
+          <p:nvPr/>
+        </p:nvSpPr>
+        <p:spPr>
+          <a:xfrm>
+            <a:off x="4387273" y="1671133"/>
+            <a:ext cx="3628302" cy="646331"/>
+          </a:xfrm>
+          <a:prstGeom prst="rect">
+            <a:avLst/>
+          </a:prstGeom>
+          <a:noFill/>
+        </p:spPr>
+        <p:txBody>
+          <a:bodyPr wrap="square" rtlCol="0">
+            <a:spAutoFit/>
+          </a:bodyPr>
+          <a:lstStyle/>
+          <a:p>
+            <a:r>
+              <a:rPr lang="en-US" dirty="0"/>
+              <a:t>Hypertension is seen in almost 25%</a:t>
+            </a:r>
+          </a:p>
+          <a:p>
+            <a:r>
+              <a:rPr lang="en-US" dirty="0"/>
+              <a:t>of Diabetic females and </a:t>
+            </a:r>
+            <a:r>
+              <a:rPr lang="en-US"/>
+              <a:t>males. </a:t>
+            </a:r>
+            <a:endParaRPr lang="en-US" dirty="0"/>
+          </a:p>
+        </p:txBody>
+      </p:sp>
+      <p:pic>
+        <p:nvPicPr>
+          <p:cNvPr id="11" name="Picture 10">
+            <a:extLst>
+              <a:ext uri="{FF2B5EF4-FFF2-40B4-BE49-F238E27FC236}">
+                <a16:creationId xmlns:a16="http://schemas.microsoft.com/office/drawing/2014/main" id="{CB2854D8-36C4-D465-FE86-A66FEA2DD976}"/>
+              </a:ext>
+            </a:extLst>
+          </p:cNvPr>
+          <p:cNvPicPr>
+            <a:picLocks noChangeAspect="1"/>
+          </p:cNvPicPr>
+          <p:nvPr/>
+        </p:nvPicPr>
+        <p:blipFill>
+          <a:blip r:embed="rId4"/>
+          <a:stretch>
+            <a:fillRect/>
+          </a:stretch>
+        </p:blipFill>
+        <p:spPr>
+          <a:xfrm>
+            <a:off x="8847599" y="3886622"/>
+            <a:ext cx="3032216" cy="3010137"/>
+          </a:xfrm>
+          <a:prstGeom prst="rect">
+            <a:avLst/>
+          </a:prstGeom>
+        </p:spPr>
+      </p:pic>
+      <p:pic>
+        <p:nvPicPr>
+          <p:cNvPr id="13" name="Picture 12">
+            <a:extLst>
+              <a:ext uri="{FF2B5EF4-FFF2-40B4-BE49-F238E27FC236}">
+                <a16:creationId xmlns:a16="http://schemas.microsoft.com/office/drawing/2014/main" id="{DBAF9021-9B39-C84F-CEC2-EBF82911B1B5}"/>
+              </a:ext>
+            </a:extLst>
+          </p:cNvPr>
+          <p:cNvPicPr>
+            <a:picLocks noChangeAspect="1"/>
+          </p:cNvPicPr>
+          <p:nvPr/>
+        </p:nvPicPr>
+        <p:blipFill>
+          <a:blip r:embed="rId5"/>
+          <a:stretch>
+            <a:fillRect/>
+          </a:stretch>
+        </p:blipFill>
+        <p:spPr>
+          <a:xfrm>
+            <a:off x="109249" y="3915393"/>
+            <a:ext cx="3159213" cy="2976070"/>
           </a:xfrm>
           <a:prstGeom prst="rect">
             <a:avLst/>
@@ -18731,7 +17956,7 @@
     </p:spTree>
     <p:extLst>
       <p:ext uri="{BB962C8B-B14F-4D97-AF65-F5344CB8AC3E}">
-        <p14:creationId xmlns:p14="http://schemas.microsoft.com/office/powerpoint/2010/main" val="3925428744"/>
+        <p14:creationId xmlns:p14="http://schemas.microsoft.com/office/powerpoint/2010/main" val="59226085"/>
       </p:ext>
     </p:extLst>
   </p:cSld>
@@ -18740,13 +17965,13 @@
   </p:clrMapOvr>
   <mc:AlternateContent xmlns:mc="http://schemas.openxmlformats.org/markup-compatibility/2006" xmlns:p14="http://schemas.microsoft.com/office/powerpoint/2010/main">
     <mc:Choice Requires="p14">
-      <p:transition spd="slow" p14:dur="3400">
-        <p14:reveal/>
+      <p:transition spd="slow" p14:dur="3500">
+        <p:cover/>
       </p:transition>
     </mc:Choice>
     <mc:Fallback xmlns="">
       <p:transition spd="slow">
-        <p:fade/>
+        <p:cover/>
       </p:transition>
     </mc:Fallback>
   </mc:AlternateContent>
@@ -18788,8 +18013,8 @@
         </p:nvSpPr>
         <p:spPr>
           <a:xfrm>
-            <a:off x="165340" y="497517"/>
-            <a:ext cx="11861319" cy="623917"/>
+            <a:off x="550861" y="549275"/>
+            <a:ext cx="11448481" cy="3870325"/>
           </a:xfrm>
         </p:spPr>
         <p:txBody>
@@ -18798,15 +18023,27 @@
           <a:p>
             <a:pPr algn="ctr"/>
             <a:r>
-              <a:rPr lang="en-US" sz="3900" dirty="0"/>
-              <a:t>Non-Diabetic: Males Vs. Female -Age </a:t>
-            </a:r>
-            <a:r>
-              <a:rPr lang="en-US" sz="3900" u="sng" dirty="0"/>
+              <a:rPr lang="en-US" sz="4000" dirty="0"/>
+              <a:t>Glycosylated Hgb( </a:t>
+            </a:r>
+            <a:r>
+              <a:rPr lang="en-US" sz="4000" dirty="0">
+                <a:solidFill>
+                  <a:srgbClr val="FF6600"/>
+                </a:solidFill>
+              </a:rPr>
+              <a:t>A1C</a:t>
+            </a:r>
+            <a:r>
+              <a:rPr lang="en-US" sz="4000" dirty="0"/>
+              <a:t>): Males Vs. Female - Age </a:t>
+            </a:r>
+            <a:r>
+              <a:rPr lang="en-US" sz="4000" u="sng" dirty="0"/>
               <a:t>&gt;</a:t>
             </a:r>
             <a:r>
-              <a:rPr lang="en-US" sz="3900" dirty="0"/>
+              <a:rPr lang="en-US" sz="4000" dirty="0"/>
               <a:t> 30</a:t>
             </a:r>
           </a:p>
@@ -18839,7 +18076,7 @@
           <a:lstStyle/>
           <a:p>
             <a:r>
-              <a:rPr lang="en-US"/>
+              <a:rPr lang="en-US" dirty="0"/>
               <a:t>Thursday, May 4th, 2023</a:t>
             </a:r>
           </a:p>
@@ -18873,10 +18110,9 @@
           <a:p>
             <a:pPr algn="ctr"/>
             <a:r>
-              <a:rPr lang="en-US"/>
+              <a:rPr lang="en-US" dirty="0"/>
               <a:t>The Underlying Causes of Diabetes</a:t>
             </a:r>
-            <a:endParaRPr lang="en-US" dirty="0"/>
           </a:p>
         </p:txBody>
       </p:sp>
@@ -18911,7 +18147,7 @@
               <a:pPr/>
               <a:t>8</a:t>
             </a:fld>
-            <a:endParaRPr lang="en-US"/>
+            <a:endParaRPr lang="en-US" dirty="0"/>
           </a:p>
         </p:txBody>
       </p:sp>
@@ -18920,7 +18156,7 @@
           <p:cNvPr id="5" name="Content Placeholder 4">
             <a:extLst>
               <a:ext uri="{FF2B5EF4-FFF2-40B4-BE49-F238E27FC236}">
-                <a16:creationId xmlns:a16="http://schemas.microsoft.com/office/drawing/2014/main" id="{B3FB65F1-C88A-ABA7-DB34-FAA72100AD82}"/>
+                <a16:creationId xmlns:a16="http://schemas.microsoft.com/office/drawing/2014/main" id="{A68F42F7-B281-758E-FE66-BDBF178F45D5}"/>
               </a:ext>
             </a:extLst>
           </p:cNvPr>
@@ -18939,8 +18175,8 @@
         </p:blipFill>
         <p:spPr>
           <a:xfrm>
-            <a:off x="165340" y="1424713"/>
-            <a:ext cx="5837864" cy="4160838"/>
+            <a:off x="539763" y="1096814"/>
+            <a:ext cx="3838581" cy="2791696"/>
           </a:xfrm>
         </p:spPr>
       </p:pic>
@@ -18949,7 +18185,7 @@
           <p:cNvPr id="7" name="Picture 6">
             <a:extLst>
               <a:ext uri="{FF2B5EF4-FFF2-40B4-BE49-F238E27FC236}">
-                <a16:creationId xmlns:a16="http://schemas.microsoft.com/office/drawing/2014/main" id="{5142CB9C-BBFE-89FB-3E63-6FE1E4387DC7}"/>
+                <a16:creationId xmlns:a16="http://schemas.microsoft.com/office/drawing/2014/main" id="{957559BC-152B-458C-E602-6E1AA3A5B674}"/>
               </a:ext>
             </a:extLst>
           </p:cNvPr>
@@ -18966,33 +18202,173 @@
         </p:blipFill>
         <p:spPr>
           <a:xfrm>
-            <a:off x="6105236" y="1424713"/>
-            <a:ext cx="5921423" cy="4166927"/>
+            <a:off x="8337481" y="1096814"/>
+            <a:ext cx="3672959" cy="2791696"/>
           </a:xfrm>
           <a:prstGeom prst="rect">
             <a:avLst/>
           </a:prstGeom>
         </p:spPr>
       </p:pic>
+      <p:pic>
+        <p:nvPicPr>
+          <p:cNvPr id="9" name="Picture 8">
+            <a:extLst>
+              <a:ext uri="{FF2B5EF4-FFF2-40B4-BE49-F238E27FC236}">
+                <a16:creationId xmlns:a16="http://schemas.microsoft.com/office/drawing/2014/main" id="{0F9CC8E3-18D4-16CD-DC66-C6E4BD11431C}"/>
+              </a:ext>
+            </a:extLst>
+          </p:cNvPr>
+          <p:cNvPicPr>
+            <a:picLocks noChangeAspect="1"/>
+          </p:cNvPicPr>
+          <p:nvPr/>
+        </p:nvPicPr>
+        <p:blipFill>
+          <a:blip r:embed="rId4"/>
+          <a:stretch>
+            <a:fillRect/>
+          </a:stretch>
+        </p:blipFill>
+        <p:spPr>
+          <a:xfrm>
+            <a:off x="8337481" y="3922684"/>
+            <a:ext cx="3661861" cy="2803904"/>
+          </a:xfrm>
+          <a:prstGeom prst="rect">
+            <a:avLst/>
+          </a:prstGeom>
+        </p:spPr>
+      </p:pic>
+      <p:pic>
+        <p:nvPicPr>
+          <p:cNvPr id="11" name="Picture 10">
+            <a:extLst>
+              <a:ext uri="{FF2B5EF4-FFF2-40B4-BE49-F238E27FC236}">
+                <a16:creationId xmlns:a16="http://schemas.microsoft.com/office/drawing/2014/main" id="{818D6AE0-469E-12EE-378D-BBF1D2D9B3B1}"/>
+              </a:ext>
+            </a:extLst>
+          </p:cNvPr>
+          <p:cNvPicPr>
+            <a:picLocks noChangeAspect="1"/>
+          </p:cNvPicPr>
+          <p:nvPr/>
+        </p:nvPicPr>
+        <p:blipFill>
+          <a:blip r:embed="rId5"/>
+          <a:stretch>
+            <a:fillRect/>
+          </a:stretch>
+        </p:blipFill>
+        <p:spPr>
+          <a:xfrm>
+            <a:off x="539920" y="3922684"/>
+            <a:ext cx="3827483" cy="2905122"/>
+          </a:xfrm>
+          <a:prstGeom prst="rect">
+            <a:avLst/>
+          </a:prstGeom>
+        </p:spPr>
+      </p:pic>
+      <p:sp>
+        <p:nvSpPr>
+          <p:cNvPr id="3" name="TextBox 2">
+            <a:extLst>
+              <a:ext uri="{FF2B5EF4-FFF2-40B4-BE49-F238E27FC236}">
+                <a16:creationId xmlns:a16="http://schemas.microsoft.com/office/drawing/2014/main" id="{AEF48555-C636-995C-6614-5D5A7B3E5FB2}"/>
+              </a:ext>
+            </a:extLst>
+          </p:cNvPr>
+          <p:cNvSpPr txBox="1"/>
+          <p:nvPr/>
+        </p:nvSpPr>
+        <p:spPr>
+          <a:xfrm>
+            <a:off x="4589929" y="1362635"/>
+            <a:ext cx="3603812" cy="3970318"/>
+          </a:xfrm>
+          <a:prstGeom prst="rect">
+            <a:avLst/>
+          </a:prstGeom>
+          <a:noFill/>
+        </p:spPr>
+        <p:txBody>
+          <a:bodyPr wrap="square" rtlCol="0">
+            <a:spAutoFit/>
+          </a:bodyPr>
+          <a:lstStyle/>
+          <a:p>
+            <a:r>
+              <a:rPr lang="en-US" dirty="0"/>
+              <a:t>Mean: Female Non-Diabetics 5.39</a:t>
+            </a:r>
+          </a:p>
+          <a:p>
+            <a:r>
+              <a:rPr lang="en-US" dirty="0"/>
+              <a:t>Mean: Female Diabetics 6.94</a:t>
+            </a:r>
+          </a:p>
+          <a:p>
+            <a:r>
+              <a:rPr lang="en-US" dirty="0"/>
+              <a:t>Ttest statistic: 89.72 p-value =0.00</a:t>
+            </a:r>
+          </a:p>
+          <a:p>
+            <a:endParaRPr lang="en-US" dirty="0"/>
+          </a:p>
+          <a:p>
+            <a:endParaRPr lang="en-US" dirty="0"/>
+          </a:p>
+          <a:p>
+            <a:r>
+              <a:rPr lang="en-US" dirty="0"/>
+              <a:t>Mean: Male Non-Diabetics 5.40</a:t>
+            </a:r>
+          </a:p>
+          <a:p>
+            <a:r>
+              <a:rPr lang="en-US" dirty="0"/>
+              <a:t>Mean: Male Diabetics 6.93</a:t>
+            </a:r>
+          </a:p>
+          <a:p>
+            <a:r>
+              <a:rPr lang="en-US" dirty="0"/>
+              <a:t>Ttest statistic: 122.64 p-value=0.00</a:t>
+            </a:r>
+          </a:p>
+          <a:p>
+            <a:endParaRPr lang="en-US" dirty="0"/>
+          </a:p>
+          <a:p>
+            <a:r>
+              <a:rPr lang="en-US" dirty="0"/>
+              <a:t>This shows the AIC in males vs. females is almost identical, however there is a statistically significant difference between the diabetics and non-diabetics.</a:t>
+            </a:r>
+          </a:p>
+        </p:txBody>
+      </p:sp>
     </p:spTree>
     <p:extLst>
       <p:ext uri="{BB962C8B-B14F-4D97-AF65-F5344CB8AC3E}">
-        <p14:creationId xmlns:p14="http://schemas.microsoft.com/office/powerpoint/2010/main" val="3227877829"/>
+        <p14:creationId xmlns:p14="http://schemas.microsoft.com/office/powerpoint/2010/main" val="4155905521"/>
       </p:ext>
     </p:extLst>
   </p:cSld>
   <p:clrMapOvr>
     <a:masterClrMapping/>
   </p:clrMapOvr>
-  <mc:AlternateContent xmlns:mc="http://schemas.openxmlformats.org/markup-compatibility/2006">
-    <mc:Choice xmlns:p14="http://schemas.microsoft.com/office/powerpoint/2010/main" Requires="p14">
-      <p:transition spd="slow" p14:dur="3400">
-        <p14:reveal/>
+  <mc:AlternateContent xmlns:mc="http://schemas.openxmlformats.org/markup-compatibility/2006" xmlns:p14="http://schemas.microsoft.com/office/powerpoint/2010/main">
+    <mc:Choice Requires="p14">
+      <p:transition spd="slow" p14:dur="3000">
+        <p:comb/>
       </p:transition>
     </mc:Choice>
-    <mc:Fallback>
+    <mc:Fallback xmlns="">
       <p:transition spd="slow">
-        <p:fade/>
+        <p:comb/>
       </p:transition>
     </mc:Fallback>
   </mc:AlternateContent>
@@ -19045,7 +18421,7 @@
             <a:pPr algn="ctr"/>
             <a:r>
               <a:rPr lang="en-US" sz="4000" dirty="0"/>
-              <a:t>Hypertension(</a:t>
+              <a:t>Blood Glucose(</a:t>
             </a:r>
             <a:r>
               <a:rPr lang="en-US" sz="4000" dirty="0">
@@ -19053,11 +18429,11 @@
                   <a:srgbClr val="FF6600"/>
                 </a:solidFill>
               </a:rPr>
-              <a:t>HTN</a:t>
+              <a:t>GLU</a:t>
             </a:r>
             <a:r>
               <a:rPr lang="en-US" sz="4000" dirty="0"/>
-              <a:t>): Males Vs. Female - Age </a:t>
+              <a:t>):Males Vs. Female - Age </a:t>
             </a:r>
             <a:r>
               <a:rPr lang="en-US" sz="4000" u="sng" dirty="0"/>
@@ -19097,7 +18473,7 @@
           <a:lstStyle/>
           <a:p>
             <a:r>
-              <a:rPr lang="en-US"/>
+              <a:rPr lang="en-US" dirty="0"/>
               <a:t>Thursday, May 4th, 2023</a:t>
             </a:r>
           </a:p>
@@ -19131,10 +18507,9 @@
           <a:p>
             <a:pPr algn="ctr"/>
             <a:r>
-              <a:rPr lang="en-US"/>
+              <a:rPr lang="en-US" dirty="0"/>
               <a:t>The Underlying Causes of Diabetes</a:t>
             </a:r>
-            <a:endParaRPr lang="en-US" dirty="0"/>
           </a:p>
         </p:txBody>
       </p:sp>
@@ -19169,39 +18544,222 @@
               <a:pPr/>
               <a:t>9</a:t>
             </a:fld>
-            <a:endParaRPr lang="en-US"/>
-          </a:p>
-        </p:txBody>
-      </p:sp>
-      <p:sp>
-        <p:nvSpPr>
-          <p:cNvPr id="7" name="Content Placeholder 6">
-            <a:extLst>
-              <a:ext uri="{FF2B5EF4-FFF2-40B4-BE49-F238E27FC236}">
-                <a16:creationId xmlns:a16="http://schemas.microsoft.com/office/drawing/2014/main" id="{59E15C45-84E1-DFDF-3671-B442930B194F}"/>
-              </a:ext>
-            </a:extLst>
-          </p:cNvPr>
-          <p:cNvSpPr>
-            <a:spLocks noGrp="1"/>
-          </p:cNvSpPr>
+            <a:endParaRPr lang="en-US" dirty="0"/>
+          </a:p>
+        </p:txBody>
+      </p:sp>
+      <p:pic>
+        <p:nvPicPr>
+          <p:cNvPr id="5" name="Content Placeholder 4">
+            <a:extLst>
+              <a:ext uri="{FF2B5EF4-FFF2-40B4-BE49-F238E27FC236}">
+                <a16:creationId xmlns:a16="http://schemas.microsoft.com/office/drawing/2014/main" id="{761D4508-2D2B-705E-D9B4-7E8D2BD798BB}"/>
+              </a:ext>
+            </a:extLst>
+          </p:cNvPr>
+          <p:cNvPicPr>
+            <a:picLocks noGrp="1" noChangeAspect="1"/>
+          </p:cNvPicPr>
           <p:nvPr>
             <p:ph idx="1"/>
           </p:nvPr>
-        </p:nvSpPr>
-        <p:spPr/>
-        <p:txBody>
-          <a:bodyPr/>
+        </p:nvPicPr>
+        <p:blipFill>
+          <a:blip r:embed="rId2"/>
+          <a:stretch>
+            <a:fillRect/>
+          </a:stretch>
+        </p:blipFill>
+        <p:spPr>
+          <a:xfrm>
+            <a:off x="235979" y="3779534"/>
+            <a:ext cx="3791077" cy="2740025"/>
+          </a:xfrm>
+        </p:spPr>
+      </p:pic>
+      <p:pic>
+        <p:nvPicPr>
+          <p:cNvPr id="7" name="Picture 6">
+            <a:extLst>
+              <a:ext uri="{FF2B5EF4-FFF2-40B4-BE49-F238E27FC236}">
+                <a16:creationId xmlns:a16="http://schemas.microsoft.com/office/drawing/2014/main" id="{A57FBBE4-D51D-AD78-36D3-68CF2347BA4D}"/>
+              </a:ext>
+            </a:extLst>
+          </p:cNvPr>
+          <p:cNvPicPr>
+            <a:picLocks noChangeAspect="1"/>
+          </p:cNvPicPr>
+          <p:nvPr/>
+        </p:nvPicPr>
+        <p:blipFill>
+          <a:blip r:embed="rId3"/>
+          <a:stretch>
+            <a:fillRect/>
+          </a:stretch>
+        </p:blipFill>
+        <p:spPr>
+          <a:xfrm>
+            <a:off x="232088" y="1010566"/>
+            <a:ext cx="3794968" cy="2661790"/>
+          </a:xfrm>
+          <a:prstGeom prst="rect">
+            <a:avLst/>
+          </a:prstGeom>
+        </p:spPr>
+      </p:pic>
+      <p:pic>
+        <p:nvPicPr>
+          <p:cNvPr id="9" name="Picture 8">
+            <a:extLst>
+              <a:ext uri="{FF2B5EF4-FFF2-40B4-BE49-F238E27FC236}">
+                <a16:creationId xmlns:a16="http://schemas.microsoft.com/office/drawing/2014/main" id="{3522DB7B-AD6F-DE6A-1811-D829C323EB9A}"/>
+              </a:ext>
+            </a:extLst>
+          </p:cNvPr>
+          <p:cNvPicPr>
+            <a:picLocks noChangeAspect="1"/>
+          </p:cNvPicPr>
+          <p:nvPr/>
+        </p:nvPicPr>
+        <p:blipFill>
+          <a:blip r:embed="rId4"/>
+          <a:stretch>
+            <a:fillRect/>
+          </a:stretch>
+        </p:blipFill>
+        <p:spPr>
+          <a:xfrm>
+            <a:off x="8164946" y="1133512"/>
+            <a:ext cx="3699696" cy="2646022"/>
+          </a:xfrm>
+          <a:prstGeom prst="rect">
+            <a:avLst/>
+          </a:prstGeom>
+        </p:spPr>
+      </p:pic>
+      <p:pic>
+        <p:nvPicPr>
+          <p:cNvPr id="11" name="Picture 10">
+            <a:extLst>
+              <a:ext uri="{FF2B5EF4-FFF2-40B4-BE49-F238E27FC236}">
+                <a16:creationId xmlns:a16="http://schemas.microsoft.com/office/drawing/2014/main" id="{FA262FEB-97C7-58B8-6F81-8E1662A4D352}"/>
+              </a:ext>
+            </a:extLst>
+          </p:cNvPr>
+          <p:cNvPicPr>
+            <a:picLocks noChangeAspect="1"/>
+          </p:cNvPicPr>
+          <p:nvPr/>
+        </p:nvPicPr>
+        <p:blipFill>
+          <a:blip r:embed="rId5"/>
+          <a:stretch>
+            <a:fillRect/>
+          </a:stretch>
+        </p:blipFill>
+        <p:spPr>
+          <a:xfrm>
+            <a:off x="8164946" y="3891301"/>
+            <a:ext cx="3699696" cy="2692855"/>
+          </a:xfrm>
+          <a:prstGeom prst="rect">
+            <a:avLst/>
+          </a:prstGeom>
+        </p:spPr>
+      </p:pic>
+      <p:sp>
+        <p:nvSpPr>
+          <p:cNvPr id="4" name="TextBox 3">
+            <a:extLst>
+              <a:ext uri="{FF2B5EF4-FFF2-40B4-BE49-F238E27FC236}">
+                <a16:creationId xmlns:a16="http://schemas.microsoft.com/office/drawing/2014/main" id="{79444BC7-0BA1-C581-8838-906EF14A3079}"/>
+              </a:ext>
+            </a:extLst>
+          </p:cNvPr>
+          <p:cNvSpPr txBox="1"/>
+          <p:nvPr/>
+        </p:nvSpPr>
+        <p:spPr>
+          <a:xfrm>
+            <a:off x="4195482" y="1010565"/>
+            <a:ext cx="3791077" cy="5355312"/>
+          </a:xfrm>
+          <a:prstGeom prst="rect">
+            <a:avLst/>
+          </a:prstGeom>
+          <a:noFill/>
+        </p:spPr>
+        <p:txBody>
+          <a:bodyPr wrap="square" rtlCol="0">
+            <a:spAutoFit/>
+          </a:bodyPr>
           <a:lstStyle/>
           <a:p>
-            <a:endParaRPr lang="en-US"/>
+            <a:r>
+              <a:rPr lang="en-US" dirty="0"/>
+              <a:t>Female Mean Blood Glucose </a:t>
+            </a:r>
+          </a:p>
+          <a:p>
+            <a:r>
+              <a:rPr lang="en-US" dirty="0"/>
+              <a:t>Diabetics:  194</a:t>
+            </a:r>
+          </a:p>
+          <a:p>
+            <a:r>
+              <a:rPr lang="en-US" dirty="0"/>
+              <a:t>Female Mean Blood Glucose Non-Diabetics:  132</a:t>
+            </a:r>
+          </a:p>
+          <a:p>
+            <a:r>
+              <a:rPr lang="en-US" dirty="0"/>
+              <a:t>Ttest value:  67.03   p-value  0.00</a:t>
+            </a:r>
+          </a:p>
+          <a:p>
+            <a:endParaRPr lang="en-US" dirty="0"/>
+          </a:p>
+          <a:p>
+            <a:r>
+              <a:rPr lang="en-US" dirty="0"/>
+              <a:t>Male Mean Blood Glucose </a:t>
+            </a:r>
+          </a:p>
+          <a:p>
+            <a:r>
+              <a:rPr lang="en-US" dirty="0"/>
+              <a:t>Diabetics:  194.38</a:t>
+            </a:r>
+          </a:p>
+          <a:p>
+            <a:r>
+              <a:rPr lang="en-US" dirty="0"/>
+              <a:t>Male Mean Blood Glucose Non-Diabetics:  132.92</a:t>
+            </a:r>
+          </a:p>
+          <a:p>
+            <a:r>
+              <a:rPr lang="en-US" dirty="0"/>
+              <a:t>Ttest value:   64.03    p-value  0.00</a:t>
+            </a:r>
+          </a:p>
+          <a:p>
+            <a:endParaRPr lang="en-US" dirty="0"/>
+          </a:p>
+          <a:p>
+            <a:r>
+              <a:rPr lang="en-US" dirty="0"/>
+              <a:t>This shows there is practically no difference between the male and female diabetics and non-diabetics with regard to the blood glucose level, however there is a significant difference between diabetic and non-diabetic blood glucose levels.</a:t>
+            </a:r>
           </a:p>
         </p:txBody>
       </p:sp>
     </p:spTree>
     <p:extLst>
       <p:ext uri="{BB962C8B-B14F-4D97-AF65-F5344CB8AC3E}">
-        <p14:creationId xmlns:p14="http://schemas.microsoft.com/office/powerpoint/2010/main" val="59226085"/>
+        <p14:creationId xmlns:p14="http://schemas.microsoft.com/office/powerpoint/2010/main" val="1436951672"/>
       </p:ext>
     </p:extLst>
   </p:cSld>
@@ -19210,13 +18768,13 @@
   </p:clrMapOvr>
   <mc:AlternateContent xmlns:mc="http://schemas.openxmlformats.org/markup-compatibility/2006" xmlns:p14="http://schemas.microsoft.com/office/powerpoint/2010/main">
     <mc:Choice Requires="p14">
-      <p:transition spd="slow" p14:dur="3500">
-        <p:cover/>
+      <p:transition spd="slow" p14:dur="2000">
+        <p14:warp dir="in"/>
       </p:transition>
     </mc:Choice>
     <mc:Fallback xmlns="">
       <p:transition spd="slow">
-        <p:cover/>
+        <p:fade/>
       </p:transition>
     </mc:Fallback>
   </mc:AlternateContent>

</xml_diff>